<commit_message>
Max' update as of 2022-03-08.
</commit_message>
<xml_diff>
--- a/V3.1.1/resources/xMCF-AP242-federative_use.pptx
+++ b/V3.1.1/resources/xMCF-AP242-federative_use.pptx
@@ -6,12 +6,14 @@
     <p:sldMasterId id="2147483660" r:id="rId2"/>
   </p:sldMasterIdLst>
   <p:notesMasterIdLst>
-    <p:notesMasterId r:id="rId6"/>
+    <p:notesMasterId r:id="rId8"/>
   </p:notesMasterIdLst>
   <p:sldIdLst>
     <p:sldId id="264" r:id="rId3"/>
-    <p:sldId id="265" r:id="rId4"/>
-    <p:sldId id="263" r:id="rId5"/>
+    <p:sldId id="267" r:id="rId4"/>
+    <p:sldId id="266" r:id="rId5"/>
+    <p:sldId id="265" r:id="rId6"/>
+    <p:sldId id="263" r:id="rId7"/>
   </p:sldIdLst>
   <p:sldSz cx="12192000" cy="6858000"/>
   <p:notesSz cx="6858000" cy="9144000"/>
@@ -212,7 +214,7 @@
           <a:p>
             <a:fld id="{72D6283C-715D-3549-9353-CA356AC16166}" type="datetimeFigureOut">
               <a:rPr lang="en-GB" smtClean="0"/>
-              <a:t>02/03/2022</a:t>
+              <a:t>08/03/2022</a:t>
             </a:fld>
             <a:endParaRPr lang="en-GB"/>
           </a:p>
@@ -626,7 +628,7 @@
           <a:p>
             <a:fld id="{5E3C2F0F-5319-E442-B0D3-541EDE28C930}" type="datetimeFigureOut">
               <a:rPr lang="en-GB" smtClean="0"/>
-              <a:t>02/03/2022</a:t>
+              <a:t>08/03/2022</a:t>
             </a:fld>
             <a:endParaRPr lang="en-GB"/>
           </a:p>
@@ -824,7 +826,7 @@
           <a:p>
             <a:fld id="{5E3C2F0F-5319-E442-B0D3-541EDE28C930}" type="datetimeFigureOut">
               <a:rPr lang="en-GB" smtClean="0"/>
-              <a:t>02/03/2022</a:t>
+              <a:t>08/03/2022</a:t>
             </a:fld>
             <a:endParaRPr lang="en-GB"/>
           </a:p>
@@ -1032,7 +1034,7 @@
           <a:p>
             <a:fld id="{5E3C2F0F-5319-E442-B0D3-541EDE28C930}" type="datetimeFigureOut">
               <a:rPr lang="en-GB" smtClean="0"/>
-              <a:t>02/03/2022</a:t>
+              <a:t>08/03/2022</a:t>
             </a:fld>
             <a:endParaRPr lang="en-GB"/>
           </a:p>
@@ -3380,7 +3382,7 @@
           <a:p>
             <a:fld id="{5E3C2F0F-5319-E442-B0D3-541EDE28C930}" type="datetimeFigureOut">
               <a:rPr lang="en-GB" smtClean="0"/>
-              <a:t>02/03/2022</a:t>
+              <a:t>08/03/2022</a:t>
             </a:fld>
             <a:endParaRPr lang="en-GB"/>
           </a:p>
@@ -3919,7 +3921,7 @@
           <a:p>
             <a:fld id="{5E3C2F0F-5319-E442-B0D3-541EDE28C930}" type="datetimeFigureOut">
               <a:rPr lang="en-GB" smtClean="0"/>
-              <a:t>02/03/2022</a:t>
+              <a:t>08/03/2022</a:t>
             </a:fld>
             <a:endParaRPr lang="en-GB"/>
           </a:p>
@@ -4184,7 +4186,7 @@
           <a:p>
             <a:fld id="{5E3C2F0F-5319-E442-B0D3-541EDE28C930}" type="datetimeFigureOut">
               <a:rPr lang="en-GB" smtClean="0"/>
-              <a:t>02/03/2022</a:t>
+              <a:t>08/03/2022</a:t>
             </a:fld>
             <a:endParaRPr lang="en-GB"/>
           </a:p>
@@ -4596,7 +4598,7 @@
           <a:p>
             <a:fld id="{5E3C2F0F-5319-E442-B0D3-541EDE28C930}" type="datetimeFigureOut">
               <a:rPr lang="en-GB" smtClean="0"/>
-              <a:t>02/03/2022</a:t>
+              <a:t>08/03/2022</a:t>
             </a:fld>
             <a:endParaRPr lang="en-GB"/>
           </a:p>
@@ -4737,7 +4739,7 @@
           <a:p>
             <a:fld id="{5E3C2F0F-5319-E442-B0D3-541EDE28C930}" type="datetimeFigureOut">
               <a:rPr lang="en-GB" smtClean="0"/>
-              <a:t>02/03/2022</a:t>
+              <a:t>08/03/2022</a:t>
             </a:fld>
             <a:endParaRPr lang="en-GB"/>
           </a:p>
@@ -4850,7 +4852,7 @@
           <a:p>
             <a:fld id="{5E3C2F0F-5319-E442-B0D3-541EDE28C930}" type="datetimeFigureOut">
               <a:rPr lang="en-GB" smtClean="0"/>
-              <a:t>02/03/2022</a:t>
+              <a:t>08/03/2022</a:t>
             </a:fld>
             <a:endParaRPr lang="en-GB"/>
           </a:p>
@@ -5161,7 +5163,7 @@
           <a:p>
             <a:fld id="{5E3C2F0F-5319-E442-B0D3-541EDE28C930}" type="datetimeFigureOut">
               <a:rPr lang="en-GB" smtClean="0"/>
-              <a:t>02/03/2022</a:t>
+              <a:t>08/03/2022</a:t>
             </a:fld>
             <a:endParaRPr lang="en-GB"/>
           </a:p>
@@ -5449,7 +5451,7 @@
           <a:p>
             <a:fld id="{5E3C2F0F-5319-E442-B0D3-541EDE28C930}" type="datetimeFigureOut">
               <a:rPr lang="en-GB" smtClean="0"/>
-              <a:t>02/03/2022</a:t>
+              <a:t>08/03/2022</a:t>
             </a:fld>
             <a:endParaRPr lang="en-GB"/>
           </a:p>
@@ -5690,7 +5692,7 @@
           <a:p>
             <a:fld id="{5E3C2F0F-5319-E442-B0D3-541EDE28C930}" type="datetimeFigureOut">
               <a:rPr lang="en-GB" smtClean="0"/>
-              <a:t>02/03/2022</a:t>
+              <a:t>08/03/2022</a:t>
             </a:fld>
             <a:endParaRPr lang="en-GB"/>
           </a:p>
@@ -6392,7 +6394,7 @@
     <p:controls>
       <mc:AlternateContent xmlns:mc="http://schemas.openxmlformats.org/markup-compatibility/2006">
         <mc:Choice xmlns:v="urn:schemas-microsoft-com:vml" Requires="v">
-          <p:control spid="1038" name="Image1" r:id="rId14" imgW="9144000" imgH="114480"/>
+          <p:control spid="1044" name="Image1" r:id="rId14" imgW="9144000" imgH="114480"/>
         </mc:Choice>
         <mc:Fallback>
           <p:control name="Image1" r:id="rId14" imgW="9144000" imgH="114480">
@@ -6455,7 +6457,7 @@
       </mc:AlternateContent>
       <mc:AlternateContent xmlns:mc="http://schemas.openxmlformats.org/markup-compatibility/2006">
         <mc:Choice xmlns:v="urn:schemas-microsoft-com:vml" Requires="v">
-          <p:control spid="1039" name="Image2" r:id="rId15" imgW="561960" imgH="771480"/>
+          <p:control spid="1045" name="Image2" r:id="rId15" imgW="561960" imgH="771480"/>
         </mc:Choice>
         <mc:Fallback>
           <p:control name="Image2" r:id="rId15" imgW="561960" imgH="771480">
@@ -6518,7 +6520,7 @@
       </mc:AlternateContent>
       <mc:AlternateContent xmlns:mc="http://schemas.openxmlformats.org/markup-compatibility/2006">
         <mc:Choice xmlns:v="urn:schemas-microsoft-com:vml" Requires="v">
-          <p:control spid="1040" name="Image3" r:id="rId16" imgW="552600" imgH="504720"/>
+          <p:control spid="1046" name="Image3" r:id="rId16" imgW="552600" imgH="504720"/>
         </mc:Choice>
         <mc:Fallback>
           <p:control name="Image3" r:id="rId16" imgW="552600" imgH="504720">
@@ -6873,6 +6875,2200 @@
       </p:grpSpPr>
       <p:pic>
         <p:nvPicPr>
+          <p:cNvPr id="21" name="Grafik 20">
+            <a:extLst>
+              <a:ext uri="{FF2B5EF4-FFF2-40B4-BE49-F238E27FC236}">
+                <a16:creationId xmlns:a16="http://schemas.microsoft.com/office/drawing/2014/main" id="{BFD84F82-1AC8-4965-9B27-DB09D77634B3}"/>
+              </a:ext>
+            </a:extLst>
+          </p:cNvPr>
+          <p:cNvPicPr>
+            <a:picLocks noChangeAspect="1"/>
+          </p:cNvPicPr>
+          <p:nvPr/>
+        </p:nvPicPr>
+        <p:blipFill>
+          <a:blip r:embed="rId2"/>
+          <a:stretch>
+            <a:fillRect/>
+          </a:stretch>
+        </p:blipFill>
+        <p:spPr>
+          <a:xfrm>
+            <a:off x="1137414" y="106018"/>
+            <a:ext cx="7177524" cy="6692698"/>
+          </a:xfrm>
+          <a:prstGeom prst="rect">
+            <a:avLst/>
+          </a:prstGeom>
+        </p:spPr>
+      </p:pic>
+      <p:sp>
+        <p:nvSpPr>
+          <p:cNvPr id="8" name="Rechteck 7">
+            <a:extLst>
+              <a:ext uri="{FF2B5EF4-FFF2-40B4-BE49-F238E27FC236}">
+                <a16:creationId xmlns:a16="http://schemas.microsoft.com/office/drawing/2014/main" id="{EF1F7D52-E89B-4D8F-A74E-A4343A3C0C8C}"/>
+              </a:ext>
+            </a:extLst>
+          </p:cNvPr>
+          <p:cNvSpPr/>
+          <p:nvPr/>
+        </p:nvSpPr>
+        <p:spPr>
+          <a:xfrm>
+            <a:off x="2730724" y="416637"/>
+            <a:ext cx="4315535" cy="1075033"/>
+          </a:xfrm>
+          <a:custGeom>
+            <a:avLst/>
+            <a:gdLst>
+              <a:gd name="connsiteX0" fmla="*/ 0 w 3388478"/>
+              <a:gd name="connsiteY0" fmla="*/ 0 h 576064"/>
+              <a:gd name="connsiteX1" fmla="*/ 3388478 w 3388478"/>
+              <a:gd name="connsiteY1" fmla="*/ 0 h 576064"/>
+              <a:gd name="connsiteX2" fmla="*/ 3388478 w 3388478"/>
+              <a:gd name="connsiteY2" fmla="*/ 576064 h 576064"/>
+              <a:gd name="connsiteX3" fmla="*/ 0 w 3388478"/>
+              <a:gd name="connsiteY3" fmla="*/ 576064 h 576064"/>
+              <a:gd name="connsiteX4" fmla="*/ 0 w 3388478"/>
+              <a:gd name="connsiteY4" fmla="*/ 0 h 576064"/>
+              <a:gd name="connsiteX0" fmla="*/ 0 w 3388478"/>
+              <a:gd name="connsiteY0" fmla="*/ 0 h 576665"/>
+              <a:gd name="connsiteX1" fmla="*/ 3388478 w 3388478"/>
+              <a:gd name="connsiteY1" fmla="*/ 0 h 576665"/>
+              <a:gd name="connsiteX2" fmla="*/ 3388478 w 3388478"/>
+              <a:gd name="connsiteY2" fmla="*/ 576064 h 576665"/>
+              <a:gd name="connsiteX3" fmla="*/ 1765361 w 3388478"/>
+              <a:gd name="connsiteY3" fmla="*/ 576665 h 576665"/>
+              <a:gd name="connsiteX4" fmla="*/ 0 w 3388478"/>
+              <a:gd name="connsiteY4" fmla="*/ 576064 h 576665"/>
+              <a:gd name="connsiteX5" fmla="*/ 0 w 3388478"/>
+              <a:gd name="connsiteY5" fmla="*/ 0 h 576665"/>
+              <a:gd name="connsiteX0" fmla="*/ 0 w 3388478"/>
+              <a:gd name="connsiteY0" fmla="*/ 0 h 576665"/>
+              <a:gd name="connsiteX1" fmla="*/ 3388478 w 3388478"/>
+              <a:gd name="connsiteY1" fmla="*/ 0 h 576665"/>
+              <a:gd name="connsiteX2" fmla="*/ 3388478 w 3388478"/>
+              <a:gd name="connsiteY2" fmla="*/ 576064 h 576665"/>
+              <a:gd name="connsiteX3" fmla="*/ 1765361 w 3388478"/>
+              <a:gd name="connsiteY3" fmla="*/ 576665 h 576665"/>
+              <a:gd name="connsiteX4" fmla="*/ 1532605 w 3388478"/>
+              <a:gd name="connsiteY4" fmla="*/ 576665 h 576665"/>
+              <a:gd name="connsiteX5" fmla="*/ 0 w 3388478"/>
+              <a:gd name="connsiteY5" fmla="*/ 576064 h 576665"/>
+              <a:gd name="connsiteX6" fmla="*/ 0 w 3388478"/>
+              <a:gd name="connsiteY6" fmla="*/ 0 h 576665"/>
+              <a:gd name="connsiteX0" fmla="*/ 0 w 3388478"/>
+              <a:gd name="connsiteY0" fmla="*/ 0 h 1092055"/>
+              <a:gd name="connsiteX1" fmla="*/ 3388478 w 3388478"/>
+              <a:gd name="connsiteY1" fmla="*/ 0 h 1092055"/>
+              <a:gd name="connsiteX2" fmla="*/ 3388478 w 3388478"/>
+              <a:gd name="connsiteY2" fmla="*/ 576064 h 1092055"/>
+              <a:gd name="connsiteX3" fmla="*/ 1765361 w 3388478"/>
+              <a:gd name="connsiteY3" fmla="*/ 576665 h 1092055"/>
+              <a:gd name="connsiteX4" fmla="*/ 1765361 w 3388478"/>
+              <a:gd name="connsiteY4" fmla="*/ 1092055 h 1092055"/>
+              <a:gd name="connsiteX5" fmla="*/ 0 w 3388478"/>
+              <a:gd name="connsiteY5" fmla="*/ 576064 h 1092055"/>
+              <a:gd name="connsiteX6" fmla="*/ 0 w 3388478"/>
+              <a:gd name="connsiteY6" fmla="*/ 0 h 1092055"/>
+              <a:gd name="connsiteX0" fmla="*/ 0 w 3388478"/>
+              <a:gd name="connsiteY0" fmla="*/ 0 h 1116392"/>
+              <a:gd name="connsiteX1" fmla="*/ 3388478 w 3388478"/>
+              <a:gd name="connsiteY1" fmla="*/ 0 h 1116392"/>
+              <a:gd name="connsiteX2" fmla="*/ 3388478 w 3388478"/>
+              <a:gd name="connsiteY2" fmla="*/ 576064 h 1116392"/>
+              <a:gd name="connsiteX3" fmla="*/ 1765361 w 3388478"/>
+              <a:gd name="connsiteY3" fmla="*/ 576665 h 1116392"/>
+              <a:gd name="connsiteX4" fmla="*/ 1765361 w 3388478"/>
+              <a:gd name="connsiteY4" fmla="*/ 1092055 h 1116392"/>
+              <a:gd name="connsiteX5" fmla="*/ 299258 w 3388478"/>
+              <a:gd name="connsiteY5" fmla="*/ 1116392 h 1116392"/>
+              <a:gd name="connsiteX6" fmla="*/ 0 w 3388478"/>
+              <a:gd name="connsiteY6" fmla="*/ 0 h 1116392"/>
+              <a:gd name="connsiteX0" fmla="*/ 8313 w 3089220"/>
+              <a:gd name="connsiteY0" fmla="*/ 24938 h 1116392"/>
+              <a:gd name="connsiteX1" fmla="*/ 3089220 w 3089220"/>
+              <a:gd name="connsiteY1" fmla="*/ 0 h 1116392"/>
+              <a:gd name="connsiteX2" fmla="*/ 3089220 w 3089220"/>
+              <a:gd name="connsiteY2" fmla="*/ 576064 h 1116392"/>
+              <a:gd name="connsiteX3" fmla="*/ 1466103 w 3089220"/>
+              <a:gd name="connsiteY3" fmla="*/ 576665 h 1116392"/>
+              <a:gd name="connsiteX4" fmla="*/ 1466103 w 3089220"/>
+              <a:gd name="connsiteY4" fmla="*/ 1092055 h 1116392"/>
+              <a:gd name="connsiteX5" fmla="*/ 0 w 3089220"/>
+              <a:gd name="connsiteY5" fmla="*/ 1116392 h 1116392"/>
+              <a:gd name="connsiteX6" fmla="*/ 8313 w 3089220"/>
+              <a:gd name="connsiteY6" fmla="*/ 24938 h 1116392"/>
+              <a:gd name="connsiteX0" fmla="*/ 8313 w 3089220"/>
+              <a:gd name="connsiteY0" fmla="*/ 0 h 1124704"/>
+              <a:gd name="connsiteX1" fmla="*/ 3089220 w 3089220"/>
+              <a:gd name="connsiteY1" fmla="*/ 8312 h 1124704"/>
+              <a:gd name="connsiteX2" fmla="*/ 3089220 w 3089220"/>
+              <a:gd name="connsiteY2" fmla="*/ 584376 h 1124704"/>
+              <a:gd name="connsiteX3" fmla="*/ 1466103 w 3089220"/>
+              <a:gd name="connsiteY3" fmla="*/ 584977 h 1124704"/>
+              <a:gd name="connsiteX4" fmla="*/ 1466103 w 3089220"/>
+              <a:gd name="connsiteY4" fmla="*/ 1100367 h 1124704"/>
+              <a:gd name="connsiteX5" fmla="*/ 0 w 3089220"/>
+              <a:gd name="connsiteY5" fmla="*/ 1124704 h 1124704"/>
+              <a:gd name="connsiteX6" fmla="*/ 8313 w 3089220"/>
+              <a:gd name="connsiteY6" fmla="*/ 0 h 1124704"/>
+              <a:gd name="connsiteX0" fmla="*/ 8313 w 3089220"/>
+              <a:gd name="connsiteY0" fmla="*/ 0 h 1141931"/>
+              <a:gd name="connsiteX1" fmla="*/ 3089220 w 3089220"/>
+              <a:gd name="connsiteY1" fmla="*/ 8312 h 1141931"/>
+              <a:gd name="connsiteX2" fmla="*/ 3089220 w 3089220"/>
+              <a:gd name="connsiteY2" fmla="*/ 584376 h 1141931"/>
+              <a:gd name="connsiteX3" fmla="*/ 1466103 w 3089220"/>
+              <a:gd name="connsiteY3" fmla="*/ 584977 h 1141931"/>
+              <a:gd name="connsiteX4" fmla="*/ 1441165 w 3089220"/>
+              <a:gd name="connsiteY4" fmla="*/ 1141931 h 1141931"/>
+              <a:gd name="connsiteX5" fmla="*/ 0 w 3089220"/>
+              <a:gd name="connsiteY5" fmla="*/ 1124704 h 1141931"/>
+              <a:gd name="connsiteX6" fmla="*/ 8313 w 3089220"/>
+              <a:gd name="connsiteY6" fmla="*/ 0 h 1141931"/>
+              <a:gd name="connsiteX0" fmla="*/ 8313 w 3089220"/>
+              <a:gd name="connsiteY0" fmla="*/ 0 h 1124704"/>
+              <a:gd name="connsiteX1" fmla="*/ 3089220 w 3089220"/>
+              <a:gd name="connsiteY1" fmla="*/ 8312 h 1124704"/>
+              <a:gd name="connsiteX2" fmla="*/ 3089220 w 3089220"/>
+              <a:gd name="connsiteY2" fmla="*/ 584376 h 1124704"/>
+              <a:gd name="connsiteX3" fmla="*/ 1466103 w 3089220"/>
+              <a:gd name="connsiteY3" fmla="*/ 584977 h 1124704"/>
+              <a:gd name="connsiteX4" fmla="*/ 1441165 w 3089220"/>
+              <a:gd name="connsiteY4" fmla="*/ 1116993 h 1124704"/>
+              <a:gd name="connsiteX5" fmla="*/ 0 w 3089220"/>
+              <a:gd name="connsiteY5" fmla="*/ 1124704 h 1124704"/>
+              <a:gd name="connsiteX6" fmla="*/ 8313 w 3089220"/>
+              <a:gd name="connsiteY6" fmla="*/ 0 h 1124704"/>
+              <a:gd name="connsiteX0" fmla="*/ 8313 w 3089220"/>
+              <a:gd name="connsiteY0" fmla="*/ 0 h 1124704"/>
+              <a:gd name="connsiteX1" fmla="*/ 3089220 w 3089220"/>
+              <a:gd name="connsiteY1" fmla="*/ 8312 h 1124704"/>
+              <a:gd name="connsiteX2" fmla="*/ 3089220 w 3089220"/>
+              <a:gd name="connsiteY2" fmla="*/ 584376 h 1124704"/>
+              <a:gd name="connsiteX3" fmla="*/ 1441164 w 3089220"/>
+              <a:gd name="connsiteY3" fmla="*/ 601603 h 1124704"/>
+              <a:gd name="connsiteX4" fmla="*/ 1441165 w 3089220"/>
+              <a:gd name="connsiteY4" fmla="*/ 1116993 h 1124704"/>
+              <a:gd name="connsiteX5" fmla="*/ 0 w 3089220"/>
+              <a:gd name="connsiteY5" fmla="*/ 1124704 h 1124704"/>
+              <a:gd name="connsiteX6" fmla="*/ 8313 w 3089220"/>
+              <a:gd name="connsiteY6" fmla="*/ 0 h 1124704"/>
+              <a:gd name="connsiteX0" fmla="*/ 8313 w 3089220"/>
+              <a:gd name="connsiteY0" fmla="*/ 0 h 1124704"/>
+              <a:gd name="connsiteX1" fmla="*/ 3089220 w 3089220"/>
+              <a:gd name="connsiteY1" fmla="*/ 8312 h 1124704"/>
+              <a:gd name="connsiteX2" fmla="*/ 3080907 w 3089220"/>
+              <a:gd name="connsiteY2" fmla="*/ 609314 h 1124704"/>
+              <a:gd name="connsiteX3" fmla="*/ 1441164 w 3089220"/>
+              <a:gd name="connsiteY3" fmla="*/ 601603 h 1124704"/>
+              <a:gd name="connsiteX4" fmla="*/ 1441165 w 3089220"/>
+              <a:gd name="connsiteY4" fmla="*/ 1116993 h 1124704"/>
+              <a:gd name="connsiteX5" fmla="*/ 0 w 3089220"/>
+              <a:gd name="connsiteY5" fmla="*/ 1124704 h 1124704"/>
+              <a:gd name="connsiteX6" fmla="*/ 8313 w 3089220"/>
+              <a:gd name="connsiteY6" fmla="*/ 0 h 1124704"/>
+              <a:gd name="connsiteX0" fmla="*/ 8313 w 3089220"/>
+              <a:gd name="connsiteY0" fmla="*/ 0 h 1124704"/>
+              <a:gd name="connsiteX1" fmla="*/ 3089220 w 3089220"/>
+              <a:gd name="connsiteY1" fmla="*/ 8312 h 1124704"/>
+              <a:gd name="connsiteX2" fmla="*/ 3080907 w 3089220"/>
+              <a:gd name="connsiteY2" fmla="*/ 609314 h 1124704"/>
+              <a:gd name="connsiteX3" fmla="*/ 1441164 w 3089220"/>
+              <a:gd name="connsiteY3" fmla="*/ 601603 h 1124704"/>
+              <a:gd name="connsiteX4" fmla="*/ 2126965 w 3089220"/>
+              <a:gd name="connsiteY4" fmla="*/ 1111841 h 1124704"/>
+              <a:gd name="connsiteX5" fmla="*/ 0 w 3089220"/>
+              <a:gd name="connsiteY5" fmla="*/ 1124704 h 1124704"/>
+              <a:gd name="connsiteX6" fmla="*/ 8313 w 3089220"/>
+              <a:gd name="connsiteY6" fmla="*/ 0 h 1124704"/>
+              <a:gd name="connsiteX0" fmla="*/ 8313 w 3089220"/>
+              <a:gd name="connsiteY0" fmla="*/ 0 h 1124704"/>
+              <a:gd name="connsiteX1" fmla="*/ 3089220 w 3089220"/>
+              <a:gd name="connsiteY1" fmla="*/ 8312 h 1124704"/>
+              <a:gd name="connsiteX2" fmla="*/ 3080907 w 3089220"/>
+              <a:gd name="connsiteY2" fmla="*/ 609314 h 1124704"/>
+              <a:gd name="connsiteX3" fmla="*/ 2128458 w 3089220"/>
+              <a:gd name="connsiteY3" fmla="*/ 616555 h 1124704"/>
+              <a:gd name="connsiteX4" fmla="*/ 2126965 w 3089220"/>
+              <a:gd name="connsiteY4" fmla="*/ 1111841 h 1124704"/>
+              <a:gd name="connsiteX5" fmla="*/ 0 w 3089220"/>
+              <a:gd name="connsiteY5" fmla="*/ 1124704 h 1124704"/>
+              <a:gd name="connsiteX6" fmla="*/ 8313 w 3089220"/>
+              <a:gd name="connsiteY6" fmla="*/ 0 h 1124704"/>
+              <a:gd name="connsiteX0" fmla="*/ 8313 w 3089220"/>
+              <a:gd name="connsiteY0" fmla="*/ 0 h 1124704"/>
+              <a:gd name="connsiteX1" fmla="*/ 3089220 w 3089220"/>
+              <a:gd name="connsiteY1" fmla="*/ 8312 h 1124704"/>
+              <a:gd name="connsiteX2" fmla="*/ 3080907 w 3089220"/>
+              <a:gd name="connsiteY2" fmla="*/ 709356 h 1124704"/>
+              <a:gd name="connsiteX3" fmla="*/ 2128458 w 3089220"/>
+              <a:gd name="connsiteY3" fmla="*/ 616555 h 1124704"/>
+              <a:gd name="connsiteX4" fmla="*/ 2126965 w 3089220"/>
+              <a:gd name="connsiteY4" fmla="*/ 1111841 h 1124704"/>
+              <a:gd name="connsiteX5" fmla="*/ 0 w 3089220"/>
+              <a:gd name="connsiteY5" fmla="*/ 1124704 h 1124704"/>
+              <a:gd name="connsiteX6" fmla="*/ 8313 w 3089220"/>
+              <a:gd name="connsiteY6" fmla="*/ 0 h 1124704"/>
+              <a:gd name="connsiteX0" fmla="*/ 8313 w 3089220"/>
+              <a:gd name="connsiteY0" fmla="*/ 0 h 1124704"/>
+              <a:gd name="connsiteX1" fmla="*/ 3089220 w 3089220"/>
+              <a:gd name="connsiteY1" fmla="*/ 8312 h 1124704"/>
+              <a:gd name="connsiteX2" fmla="*/ 3080907 w 3089220"/>
+              <a:gd name="connsiteY2" fmla="*/ 709356 h 1124704"/>
+              <a:gd name="connsiteX3" fmla="*/ 2128458 w 3089220"/>
+              <a:gd name="connsiteY3" fmla="*/ 704091 h 1124704"/>
+              <a:gd name="connsiteX4" fmla="*/ 2126965 w 3089220"/>
+              <a:gd name="connsiteY4" fmla="*/ 1111841 h 1124704"/>
+              <a:gd name="connsiteX5" fmla="*/ 0 w 3089220"/>
+              <a:gd name="connsiteY5" fmla="*/ 1124704 h 1124704"/>
+              <a:gd name="connsiteX6" fmla="*/ 8313 w 3089220"/>
+              <a:gd name="connsiteY6" fmla="*/ 0 h 1124704"/>
+            </a:gdLst>
+            <a:ahLst/>
+            <a:cxnLst>
+              <a:cxn ang="0">
+                <a:pos x="connsiteX0" y="connsiteY0"/>
+              </a:cxn>
+              <a:cxn ang="0">
+                <a:pos x="connsiteX1" y="connsiteY1"/>
+              </a:cxn>
+              <a:cxn ang="0">
+                <a:pos x="connsiteX2" y="connsiteY2"/>
+              </a:cxn>
+              <a:cxn ang="0">
+                <a:pos x="connsiteX3" y="connsiteY3"/>
+              </a:cxn>
+              <a:cxn ang="0">
+                <a:pos x="connsiteX4" y="connsiteY4"/>
+              </a:cxn>
+              <a:cxn ang="0">
+                <a:pos x="connsiteX5" y="connsiteY5"/>
+              </a:cxn>
+              <a:cxn ang="0">
+                <a:pos x="connsiteX6" y="connsiteY6"/>
+              </a:cxn>
+            </a:cxnLst>
+            <a:rect l="l" t="t" r="r" b="b"/>
+            <a:pathLst>
+              <a:path w="3089220" h="1124704">
+                <a:moveTo>
+                  <a:pt x="8313" y="0"/>
+                </a:moveTo>
+                <a:lnTo>
+                  <a:pt x="3089220" y="8312"/>
+                </a:lnTo>
+                <a:lnTo>
+                  <a:pt x="3080907" y="709356"/>
+                </a:lnTo>
+                <a:lnTo>
+                  <a:pt x="2128458" y="704091"/>
+                </a:lnTo>
+                <a:cubicBezTo>
+                  <a:pt x="2128458" y="875888"/>
+                  <a:pt x="2126965" y="940044"/>
+                  <a:pt x="2126965" y="1111841"/>
+                </a:cubicBezTo>
+                <a:lnTo>
+                  <a:pt x="0" y="1124704"/>
+                </a:lnTo>
+                <a:lnTo>
+                  <a:pt x="8313" y="0"/>
+                </a:lnTo>
+                <a:close/>
+              </a:path>
+            </a:pathLst>
+          </a:custGeom>
+          <a:noFill/>
+          <a:ln w="28575"/>
+        </p:spPr>
+        <p:style>
+          <a:lnRef idx="2">
+            <a:schemeClr val="accent1">
+              <a:shade val="50000"/>
+            </a:schemeClr>
+          </a:lnRef>
+          <a:fillRef idx="1">
+            <a:schemeClr val="accent1"/>
+          </a:fillRef>
+          <a:effectRef idx="0">
+            <a:schemeClr val="accent1"/>
+          </a:effectRef>
+          <a:fontRef idx="minor">
+            <a:schemeClr val="lt1"/>
+          </a:fontRef>
+        </p:style>
+        <p:txBody>
+          <a:bodyPr rtlCol="0" anchor="ctr"/>
+          <a:lstStyle/>
+          <a:p>
+            <a:pPr algn="ctr"/>
+            <a:endParaRPr lang="en-US" dirty="0"/>
+          </a:p>
+        </p:txBody>
+      </p:sp>
+      <p:sp>
+        <p:nvSpPr>
+          <p:cNvPr id="9" name="Textfeld 8">
+            <a:extLst>
+              <a:ext uri="{FF2B5EF4-FFF2-40B4-BE49-F238E27FC236}">
+                <a16:creationId xmlns:a16="http://schemas.microsoft.com/office/drawing/2014/main" id="{CDEF191B-C051-4754-9336-84AA97468A4C}"/>
+              </a:ext>
+            </a:extLst>
+          </p:cNvPr>
+          <p:cNvSpPr txBox="1"/>
+          <p:nvPr/>
+        </p:nvSpPr>
+        <p:spPr>
+          <a:xfrm>
+            <a:off x="2728862" y="106018"/>
+            <a:ext cx="1853777" cy="307777"/>
+          </a:xfrm>
+          <a:prstGeom prst="rect">
+            <a:avLst/>
+          </a:prstGeom>
+          <a:noFill/>
+        </p:spPr>
+        <p:txBody>
+          <a:bodyPr wrap="none" rtlCol="0">
+            <a:spAutoFit/>
+          </a:bodyPr>
+          <a:lstStyle/>
+          <a:p>
+            <a:r>
+              <a:rPr lang="en-US" sz="1400" b="1" dirty="0">
+                <a:solidFill>
+                  <a:srgbClr val="004489"/>
+                </a:solidFill>
+              </a:rPr>
+              <a:t>Reference to χMCF file</a:t>
+            </a:r>
+          </a:p>
+        </p:txBody>
+      </p:sp>
+      <p:sp>
+        <p:nvSpPr>
+          <p:cNvPr id="11" name="Textfeld 10">
+            <a:extLst>
+              <a:ext uri="{FF2B5EF4-FFF2-40B4-BE49-F238E27FC236}">
+                <a16:creationId xmlns:a16="http://schemas.microsoft.com/office/drawing/2014/main" id="{AC7AFD89-29A5-458F-806D-1498F3EE0278}"/>
+              </a:ext>
+            </a:extLst>
+          </p:cNvPr>
+          <p:cNvSpPr txBox="1"/>
+          <p:nvPr/>
+        </p:nvSpPr>
+        <p:spPr>
+          <a:xfrm>
+            <a:off x="2738609" y="2505274"/>
+            <a:ext cx="1163780" cy="307777"/>
+          </a:xfrm>
+          <a:prstGeom prst="rect">
+            <a:avLst/>
+          </a:prstGeom>
+          <a:noFill/>
+        </p:spPr>
+        <p:txBody>
+          <a:bodyPr wrap="none" rtlCol="0">
+            <a:spAutoFit/>
+          </a:bodyPr>
+          <a:lstStyle/>
+          <a:p>
+            <a:r>
+              <a:rPr lang="en-US" sz="1400" b="1" dirty="0">
+                <a:solidFill>
+                  <a:srgbClr val="004489"/>
+                </a:solidFill>
+              </a:rPr>
+              <a:t>Joined Part A</a:t>
+            </a:r>
+          </a:p>
+        </p:txBody>
+      </p:sp>
+      <p:sp>
+        <p:nvSpPr>
+          <p:cNvPr id="12" name="Freihandform 6">
+            <a:extLst>
+              <a:ext uri="{FF2B5EF4-FFF2-40B4-BE49-F238E27FC236}">
+                <a16:creationId xmlns:a16="http://schemas.microsoft.com/office/drawing/2014/main" id="{F65744C2-B149-45C8-A507-D98DFB6E19C9}"/>
+              </a:ext>
+            </a:extLst>
+          </p:cNvPr>
+          <p:cNvSpPr/>
+          <p:nvPr/>
+        </p:nvSpPr>
+        <p:spPr>
+          <a:xfrm flipV="1">
+            <a:off x="2055914" y="2014150"/>
+            <a:ext cx="3436663" cy="1284861"/>
+          </a:xfrm>
+          <a:custGeom>
+            <a:avLst/>
+            <a:gdLst>
+              <a:gd name="connsiteX0" fmla="*/ 4206240 w 4206240"/>
+              <a:gd name="connsiteY0" fmla="*/ 91440 h 1795549"/>
+              <a:gd name="connsiteX1" fmla="*/ 4206240 w 4206240"/>
+              <a:gd name="connsiteY1" fmla="*/ 1795549 h 1795549"/>
+              <a:gd name="connsiteX2" fmla="*/ 0 w 4206240"/>
+              <a:gd name="connsiteY2" fmla="*/ 1795549 h 1795549"/>
+              <a:gd name="connsiteX3" fmla="*/ 0 w 4206240"/>
+              <a:gd name="connsiteY3" fmla="*/ 1221971 h 1795549"/>
+              <a:gd name="connsiteX4" fmla="*/ 1787236 w 4206240"/>
+              <a:gd name="connsiteY4" fmla="*/ 1221971 h 1795549"/>
+              <a:gd name="connsiteX5" fmla="*/ 1787236 w 4206240"/>
+              <a:gd name="connsiteY5" fmla="*/ 0 h 1795549"/>
+              <a:gd name="connsiteX6" fmla="*/ 4206240 w 4206240"/>
+              <a:gd name="connsiteY6" fmla="*/ 0 h 1795549"/>
+              <a:gd name="connsiteX7" fmla="*/ 4206240 w 4206240"/>
+              <a:gd name="connsiteY7" fmla="*/ 91440 h 1795549"/>
+              <a:gd name="connsiteX0" fmla="*/ 4206240 w 4206240"/>
+              <a:gd name="connsiteY0" fmla="*/ 91440 h 1795549"/>
+              <a:gd name="connsiteX1" fmla="*/ 4206240 w 4206240"/>
+              <a:gd name="connsiteY1" fmla="*/ 1795549 h 1795549"/>
+              <a:gd name="connsiteX2" fmla="*/ 0 w 4206240"/>
+              <a:gd name="connsiteY2" fmla="*/ 1795549 h 1795549"/>
+              <a:gd name="connsiteX3" fmla="*/ 0 w 4206240"/>
+              <a:gd name="connsiteY3" fmla="*/ 1221971 h 1795549"/>
+              <a:gd name="connsiteX4" fmla="*/ 2513920 w 4206240"/>
+              <a:gd name="connsiteY4" fmla="*/ 1205346 h 1795549"/>
+              <a:gd name="connsiteX5" fmla="*/ 1787236 w 4206240"/>
+              <a:gd name="connsiteY5" fmla="*/ 0 h 1795549"/>
+              <a:gd name="connsiteX6" fmla="*/ 4206240 w 4206240"/>
+              <a:gd name="connsiteY6" fmla="*/ 0 h 1795549"/>
+              <a:gd name="connsiteX7" fmla="*/ 4206240 w 4206240"/>
+              <a:gd name="connsiteY7" fmla="*/ 91440 h 1795549"/>
+              <a:gd name="connsiteX0" fmla="*/ 4206240 w 4206240"/>
+              <a:gd name="connsiteY0" fmla="*/ 91440 h 1795549"/>
+              <a:gd name="connsiteX1" fmla="*/ 4206240 w 4206240"/>
+              <a:gd name="connsiteY1" fmla="*/ 1795549 h 1795549"/>
+              <a:gd name="connsiteX2" fmla="*/ 0 w 4206240"/>
+              <a:gd name="connsiteY2" fmla="*/ 1795549 h 1795549"/>
+              <a:gd name="connsiteX3" fmla="*/ 0 w 4206240"/>
+              <a:gd name="connsiteY3" fmla="*/ 1221971 h 1795549"/>
+              <a:gd name="connsiteX4" fmla="*/ 2513920 w 4206240"/>
+              <a:gd name="connsiteY4" fmla="*/ 1205346 h 1795549"/>
+              <a:gd name="connsiteX5" fmla="*/ 2490480 w 4206240"/>
+              <a:gd name="connsiteY5" fmla="*/ 8313 h 1795549"/>
+              <a:gd name="connsiteX6" fmla="*/ 4206240 w 4206240"/>
+              <a:gd name="connsiteY6" fmla="*/ 0 h 1795549"/>
+              <a:gd name="connsiteX7" fmla="*/ 4206240 w 4206240"/>
+              <a:gd name="connsiteY7" fmla="*/ 91440 h 1795549"/>
+              <a:gd name="connsiteX0" fmla="*/ 4206240 w 4206240"/>
+              <a:gd name="connsiteY0" fmla="*/ 91440 h 1795549"/>
+              <a:gd name="connsiteX1" fmla="*/ 4206240 w 4206240"/>
+              <a:gd name="connsiteY1" fmla="*/ 1795549 h 1795549"/>
+              <a:gd name="connsiteX2" fmla="*/ 0 w 4206240"/>
+              <a:gd name="connsiteY2" fmla="*/ 1795549 h 1795549"/>
+              <a:gd name="connsiteX3" fmla="*/ 0 w 4206240"/>
+              <a:gd name="connsiteY3" fmla="*/ 1221971 h 1795549"/>
+              <a:gd name="connsiteX4" fmla="*/ 1605714 w 4206240"/>
+              <a:gd name="connsiteY4" fmla="*/ 1223647 h 1795549"/>
+              <a:gd name="connsiteX5" fmla="*/ 2490480 w 4206240"/>
+              <a:gd name="connsiteY5" fmla="*/ 8313 h 1795549"/>
+              <a:gd name="connsiteX6" fmla="*/ 4206240 w 4206240"/>
+              <a:gd name="connsiteY6" fmla="*/ 0 h 1795549"/>
+              <a:gd name="connsiteX7" fmla="*/ 4206240 w 4206240"/>
+              <a:gd name="connsiteY7" fmla="*/ 91440 h 1795549"/>
+              <a:gd name="connsiteX0" fmla="*/ 4206240 w 4206240"/>
+              <a:gd name="connsiteY0" fmla="*/ 91440 h 1795549"/>
+              <a:gd name="connsiteX1" fmla="*/ 4206240 w 4206240"/>
+              <a:gd name="connsiteY1" fmla="*/ 1795549 h 1795549"/>
+              <a:gd name="connsiteX2" fmla="*/ 0 w 4206240"/>
+              <a:gd name="connsiteY2" fmla="*/ 1795549 h 1795549"/>
+              <a:gd name="connsiteX3" fmla="*/ 0 w 4206240"/>
+              <a:gd name="connsiteY3" fmla="*/ 1221971 h 1795549"/>
+              <a:gd name="connsiteX4" fmla="*/ 1605714 w 4206240"/>
+              <a:gd name="connsiteY4" fmla="*/ 1223647 h 1795549"/>
+              <a:gd name="connsiteX5" fmla="*/ 1600259 w 4206240"/>
+              <a:gd name="connsiteY5" fmla="*/ 200481 h 1795549"/>
+              <a:gd name="connsiteX6" fmla="*/ 4206240 w 4206240"/>
+              <a:gd name="connsiteY6" fmla="*/ 0 h 1795549"/>
+              <a:gd name="connsiteX7" fmla="*/ 4206240 w 4206240"/>
+              <a:gd name="connsiteY7" fmla="*/ 91440 h 1795549"/>
+              <a:gd name="connsiteX0" fmla="*/ 4206240 w 4206240"/>
+              <a:gd name="connsiteY0" fmla="*/ 0 h 1704109"/>
+              <a:gd name="connsiteX1" fmla="*/ 4206240 w 4206240"/>
+              <a:gd name="connsiteY1" fmla="*/ 1704109 h 1704109"/>
+              <a:gd name="connsiteX2" fmla="*/ 0 w 4206240"/>
+              <a:gd name="connsiteY2" fmla="*/ 1704109 h 1704109"/>
+              <a:gd name="connsiteX3" fmla="*/ 0 w 4206240"/>
+              <a:gd name="connsiteY3" fmla="*/ 1130531 h 1704109"/>
+              <a:gd name="connsiteX4" fmla="*/ 1605714 w 4206240"/>
+              <a:gd name="connsiteY4" fmla="*/ 1132207 h 1704109"/>
+              <a:gd name="connsiteX5" fmla="*/ 1600259 w 4206240"/>
+              <a:gd name="connsiteY5" fmla="*/ 109041 h 1704109"/>
+              <a:gd name="connsiteX6" fmla="*/ 4206240 w 4206240"/>
+              <a:gd name="connsiteY6" fmla="*/ 91577 h 1704109"/>
+              <a:gd name="connsiteX7" fmla="*/ 4206240 w 4206240"/>
+              <a:gd name="connsiteY7" fmla="*/ 0 h 1704109"/>
+              <a:gd name="connsiteX0" fmla="*/ 4206240 w 4206240"/>
+              <a:gd name="connsiteY0" fmla="*/ -1 h 1612531"/>
+              <a:gd name="connsiteX1" fmla="*/ 4206240 w 4206240"/>
+              <a:gd name="connsiteY1" fmla="*/ 1612531 h 1612531"/>
+              <a:gd name="connsiteX2" fmla="*/ 0 w 4206240"/>
+              <a:gd name="connsiteY2" fmla="*/ 1612531 h 1612531"/>
+              <a:gd name="connsiteX3" fmla="*/ 0 w 4206240"/>
+              <a:gd name="connsiteY3" fmla="*/ 1038953 h 1612531"/>
+              <a:gd name="connsiteX4" fmla="*/ 1605714 w 4206240"/>
+              <a:gd name="connsiteY4" fmla="*/ 1040629 h 1612531"/>
+              <a:gd name="connsiteX5" fmla="*/ 1600259 w 4206240"/>
+              <a:gd name="connsiteY5" fmla="*/ 17463 h 1612531"/>
+              <a:gd name="connsiteX6" fmla="*/ 4206240 w 4206240"/>
+              <a:gd name="connsiteY6" fmla="*/ -1 h 1612531"/>
+              <a:gd name="connsiteX0" fmla="*/ 4206240 w 4206240"/>
+              <a:gd name="connsiteY0" fmla="*/ 0 h 1612532"/>
+              <a:gd name="connsiteX1" fmla="*/ 2803466 w 4206240"/>
+              <a:gd name="connsiteY1" fmla="*/ 1612532 h 1612532"/>
+              <a:gd name="connsiteX2" fmla="*/ 0 w 4206240"/>
+              <a:gd name="connsiteY2" fmla="*/ 1612532 h 1612532"/>
+              <a:gd name="connsiteX3" fmla="*/ 0 w 4206240"/>
+              <a:gd name="connsiteY3" fmla="*/ 1038954 h 1612532"/>
+              <a:gd name="connsiteX4" fmla="*/ 1605714 w 4206240"/>
+              <a:gd name="connsiteY4" fmla="*/ 1040630 h 1612532"/>
+              <a:gd name="connsiteX5" fmla="*/ 1600259 w 4206240"/>
+              <a:gd name="connsiteY5" fmla="*/ 17464 h 1612532"/>
+              <a:gd name="connsiteX6" fmla="*/ 4206240 w 4206240"/>
+              <a:gd name="connsiteY6" fmla="*/ 0 h 1612532"/>
+              <a:gd name="connsiteX0" fmla="*/ 2794474 w 2803466"/>
+              <a:gd name="connsiteY0" fmla="*/ 838 h 1595069"/>
+              <a:gd name="connsiteX1" fmla="*/ 2803466 w 2803466"/>
+              <a:gd name="connsiteY1" fmla="*/ 1595069 h 1595069"/>
+              <a:gd name="connsiteX2" fmla="*/ 0 w 2803466"/>
+              <a:gd name="connsiteY2" fmla="*/ 1595069 h 1595069"/>
+              <a:gd name="connsiteX3" fmla="*/ 0 w 2803466"/>
+              <a:gd name="connsiteY3" fmla="*/ 1021491 h 1595069"/>
+              <a:gd name="connsiteX4" fmla="*/ 1605714 w 2803466"/>
+              <a:gd name="connsiteY4" fmla="*/ 1023167 h 1595069"/>
+              <a:gd name="connsiteX5" fmla="*/ 1600259 w 2803466"/>
+              <a:gd name="connsiteY5" fmla="*/ 1 h 1595069"/>
+              <a:gd name="connsiteX6" fmla="*/ 2794474 w 2803466"/>
+              <a:gd name="connsiteY6" fmla="*/ 838 h 1595069"/>
+            </a:gdLst>
+            <a:ahLst/>
+            <a:cxnLst>
+              <a:cxn ang="0">
+                <a:pos x="connsiteX0" y="connsiteY0"/>
+              </a:cxn>
+              <a:cxn ang="0">
+                <a:pos x="connsiteX1" y="connsiteY1"/>
+              </a:cxn>
+              <a:cxn ang="0">
+                <a:pos x="connsiteX2" y="connsiteY2"/>
+              </a:cxn>
+              <a:cxn ang="0">
+                <a:pos x="connsiteX3" y="connsiteY3"/>
+              </a:cxn>
+              <a:cxn ang="0">
+                <a:pos x="connsiteX4" y="connsiteY4"/>
+              </a:cxn>
+              <a:cxn ang="0">
+                <a:pos x="connsiteX5" y="connsiteY5"/>
+              </a:cxn>
+              <a:cxn ang="0">
+                <a:pos x="connsiteX6" y="connsiteY6"/>
+              </a:cxn>
+            </a:cxnLst>
+            <a:rect l="l" t="t" r="r" b="b"/>
+            <a:pathLst>
+              <a:path w="2803466" h="1595069">
+                <a:moveTo>
+                  <a:pt x="2794474" y="838"/>
+                </a:moveTo>
+                <a:cubicBezTo>
+                  <a:pt x="2797471" y="532248"/>
+                  <a:pt x="2800469" y="1063659"/>
+                  <a:pt x="2803466" y="1595069"/>
+                </a:cubicBezTo>
+                <a:lnTo>
+                  <a:pt x="0" y="1595069"/>
+                </a:lnTo>
+                <a:lnTo>
+                  <a:pt x="0" y="1021491"/>
+                </a:lnTo>
+                <a:lnTo>
+                  <a:pt x="1605714" y="1023167"/>
+                </a:lnTo>
+                <a:cubicBezTo>
+                  <a:pt x="1603896" y="682112"/>
+                  <a:pt x="1602077" y="341056"/>
+                  <a:pt x="1600259" y="1"/>
+                </a:cubicBezTo>
+                <a:lnTo>
+                  <a:pt x="2794474" y="838"/>
+                </a:lnTo>
+                <a:close/>
+              </a:path>
+            </a:pathLst>
+          </a:custGeom>
+          <a:noFill/>
+          <a:ln w="28575"/>
+        </p:spPr>
+        <p:style>
+          <a:lnRef idx="2">
+            <a:schemeClr val="accent1">
+              <a:shade val="50000"/>
+            </a:schemeClr>
+          </a:lnRef>
+          <a:fillRef idx="1">
+            <a:schemeClr val="accent1"/>
+          </a:fillRef>
+          <a:effectRef idx="0">
+            <a:schemeClr val="accent1"/>
+          </a:effectRef>
+          <a:fontRef idx="minor">
+            <a:schemeClr val="lt1"/>
+          </a:fontRef>
+        </p:style>
+        <p:txBody>
+          <a:bodyPr rtlCol="0" anchor="ctr"/>
+          <a:lstStyle/>
+          <a:p>
+            <a:pPr algn="ctr"/>
+            <a:endParaRPr lang="en-US" dirty="0"/>
+          </a:p>
+        </p:txBody>
+      </p:sp>
+      <p:sp>
+        <p:nvSpPr>
+          <p:cNvPr id="15" name="Textfeld 14">
+            <a:extLst>
+              <a:ext uri="{FF2B5EF4-FFF2-40B4-BE49-F238E27FC236}">
+                <a16:creationId xmlns:a16="http://schemas.microsoft.com/office/drawing/2014/main" id="{77AD5DBA-AAF0-43B2-AC66-D584FEBC0D84}"/>
+              </a:ext>
+            </a:extLst>
+          </p:cNvPr>
+          <p:cNvSpPr txBox="1"/>
+          <p:nvPr/>
+        </p:nvSpPr>
+        <p:spPr>
+          <a:xfrm>
+            <a:off x="8335467" y="3633044"/>
+            <a:ext cx="1795941" cy="523220"/>
+          </a:xfrm>
+          <a:prstGeom prst="rect">
+            <a:avLst/>
+          </a:prstGeom>
+          <a:noFill/>
+        </p:spPr>
+        <p:txBody>
+          <a:bodyPr wrap="none" rtlCol="0">
+            <a:spAutoFit/>
+          </a:bodyPr>
+          <a:lstStyle/>
+          <a:p>
+            <a:r>
+              <a:rPr lang="en-US" sz="1400" b="1" dirty="0">
+                <a:solidFill>
+                  <a:srgbClr val="004489"/>
+                </a:solidFill>
+              </a:rPr>
+              <a:t>Reference to STEP file</a:t>
+            </a:r>
+            <a:br>
+              <a:rPr lang="en-US" sz="1400" b="1" dirty="0">
+                <a:solidFill>
+                  <a:srgbClr val="004489"/>
+                </a:solidFill>
+              </a:rPr>
+            </a:br>
+            <a:r>
+              <a:rPr lang="en-US" sz="1400" b="1" dirty="0">
+                <a:solidFill>
+                  <a:srgbClr val="004489"/>
+                </a:solidFill>
+              </a:rPr>
+              <a:t>(Geometry of Part B)</a:t>
+            </a:r>
+          </a:p>
+        </p:txBody>
+      </p:sp>
+      <p:sp>
+        <p:nvSpPr>
+          <p:cNvPr id="16" name="Rechteck 12">
+            <a:extLst>
+              <a:ext uri="{FF2B5EF4-FFF2-40B4-BE49-F238E27FC236}">
+                <a16:creationId xmlns:a16="http://schemas.microsoft.com/office/drawing/2014/main" id="{C3851F4A-8E6D-47A4-A8D9-DFDFFD9ACBA5}"/>
+              </a:ext>
+            </a:extLst>
+          </p:cNvPr>
+          <p:cNvSpPr/>
+          <p:nvPr/>
+        </p:nvSpPr>
+        <p:spPr>
+          <a:xfrm>
+            <a:off x="5659395" y="2007974"/>
+            <a:ext cx="2576384" cy="1470454"/>
+          </a:xfrm>
+          <a:custGeom>
+            <a:avLst/>
+            <a:gdLst>
+              <a:gd name="connsiteX0" fmla="*/ 0 w 3064024"/>
+              <a:gd name="connsiteY0" fmla="*/ 0 h 561208"/>
+              <a:gd name="connsiteX1" fmla="*/ 3064024 w 3064024"/>
+              <a:gd name="connsiteY1" fmla="*/ 0 h 561208"/>
+              <a:gd name="connsiteX2" fmla="*/ 3064024 w 3064024"/>
+              <a:gd name="connsiteY2" fmla="*/ 561208 h 561208"/>
+              <a:gd name="connsiteX3" fmla="*/ 0 w 3064024"/>
+              <a:gd name="connsiteY3" fmla="*/ 561208 h 561208"/>
+              <a:gd name="connsiteX4" fmla="*/ 0 w 3064024"/>
+              <a:gd name="connsiteY4" fmla="*/ 0 h 561208"/>
+              <a:gd name="connsiteX0" fmla="*/ 0 w 3554475"/>
+              <a:gd name="connsiteY0" fmla="*/ 0 h 561208"/>
+              <a:gd name="connsiteX1" fmla="*/ 3064024 w 3554475"/>
+              <a:gd name="connsiteY1" fmla="*/ 0 h 561208"/>
+              <a:gd name="connsiteX2" fmla="*/ 3554475 w 3554475"/>
+              <a:gd name="connsiteY2" fmla="*/ 561208 h 561208"/>
+              <a:gd name="connsiteX3" fmla="*/ 0 w 3554475"/>
+              <a:gd name="connsiteY3" fmla="*/ 561208 h 561208"/>
+              <a:gd name="connsiteX4" fmla="*/ 0 w 3554475"/>
+              <a:gd name="connsiteY4" fmla="*/ 0 h 561208"/>
+              <a:gd name="connsiteX0" fmla="*/ 0 w 3571100"/>
+              <a:gd name="connsiteY0" fmla="*/ 490451 h 1051659"/>
+              <a:gd name="connsiteX1" fmla="*/ 3571100 w 3571100"/>
+              <a:gd name="connsiteY1" fmla="*/ 0 h 1051659"/>
+              <a:gd name="connsiteX2" fmla="*/ 3554475 w 3571100"/>
+              <a:gd name="connsiteY2" fmla="*/ 1051659 h 1051659"/>
+              <a:gd name="connsiteX3" fmla="*/ 0 w 3571100"/>
+              <a:gd name="connsiteY3" fmla="*/ 1051659 h 1051659"/>
+              <a:gd name="connsiteX4" fmla="*/ 0 w 3571100"/>
+              <a:gd name="connsiteY4" fmla="*/ 490451 h 1051659"/>
+              <a:gd name="connsiteX0" fmla="*/ 0 w 3571100"/>
+              <a:gd name="connsiteY0" fmla="*/ 490451 h 1051659"/>
+              <a:gd name="connsiteX1" fmla="*/ 1967052 w 3571100"/>
+              <a:gd name="connsiteY1" fmla="*/ 221464 h 1051659"/>
+              <a:gd name="connsiteX2" fmla="*/ 3571100 w 3571100"/>
+              <a:gd name="connsiteY2" fmla="*/ 0 h 1051659"/>
+              <a:gd name="connsiteX3" fmla="*/ 3554475 w 3571100"/>
+              <a:gd name="connsiteY3" fmla="*/ 1051659 h 1051659"/>
+              <a:gd name="connsiteX4" fmla="*/ 0 w 3571100"/>
+              <a:gd name="connsiteY4" fmla="*/ 1051659 h 1051659"/>
+              <a:gd name="connsiteX5" fmla="*/ 0 w 3571100"/>
+              <a:gd name="connsiteY5" fmla="*/ 490451 h 1051659"/>
+              <a:gd name="connsiteX0" fmla="*/ 0 w 3571100"/>
+              <a:gd name="connsiteY0" fmla="*/ 493431 h 1054639"/>
+              <a:gd name="connsiteX1" fmla="*/ 1983677 w 3571100"/>
+              <a:gd name="connsiteY1" fmla="*/ 0 h 1054639"/>
+              <a:gd name="connsiteX2" fmla="*/ 3571100 w 3571100"/>
+              <a:gd name="connsiteY2" fmla="*/ 2980 h 1054639"/>
+              <a:gd name="connsiteX3" fmla="*/ 3554475 w 3571100"/>
+              <a:gd name="connsiteY3" fmla="*/ 1054639 h 1054639"/>
+              <a:gd name="connsiteX4" fmla="*/ 0 w 3571100"/>
+              <a:gd name="connsiteY4" fmla="*/ 1054639 h 1054639"/>
+              <a:gd name="connsiteX5" fmla="*/ 0 w 3571100"/>
+              <a:gd name="connsiteY5" fmla="*/ 493431 h 1054639"/>
+              <a:gd name="connsiteX0" fmla="*/ 0 w 3571100"/>
+              <a:gd name="connsiteY0" fmla="*/ 493431 h 1054639"/>
+              <a:gd name="connsiteX1" fmla="*/ 1584667 w 3571100"/>
+              <a:gd name="connsiteY1" fmla="*/ 108066 h 1054639"/>
+              <a:gd name="connsiteX2" fmla="*/ 1983677 w 3571100"/>
+              <a:gd name="connsiteY2" fmla="*/ 0 h 1054639"/>
+              <a:gd name="connsiteX3" fmla="*/ 3571100 w 3571100"/>
+              <a:gd name="connsiteY3" fmla="*/ 2980 h 1054639"/>
+              <a:gd name="connsiteX4" fmla="*/ 3554475 w 3571100"/>
+              <a:gd name="connsiteY4" fmla="*/ 1054639 h 1054639"/>
+              <a:gd name="connsiteX5" fmla="*/ 0 w 3571100"/>
+              <a:gd name="connsiteY5" fmla="*/ 1054639 h 1054639"/>
+              <a:gd name="connsiteX6" fmla="*/ 0 w 3571100"/>
+              <a:gd name="connsiteY6" fmla="*/ 493431 h 1054639"/>
+              <a:gd name="connsiteX0" fmla="*/ 0 w 3571100"/>
+              <a:gd name="connsiteY0" fmla="*/ 493431 h 1054639"/>
+              <a:gd name="connsiteX1" fmla="*/ 1983677 w 3571100"/>
+              <a:gd name="connsiteY1" fmla="*/ 482139 h 1054639"/>
+              <a:gd name="connsiteX2" fmla="*/ 1983677 w 3571100"/>
+              <a:gd name="connsiteY2" fmla="*/ 0 h 1054639"/>
+              <a:gd name="connsiteX3" fmla="*/ 3571100 w 3571100"/>
+              <a:gd name="connsiteY3" fmla="*/ 2980 h 1054639"/>
+              <a:gd name="connsiteX4" fmla="*/ 3554475 w 3571100"/>
+              <a:gd name="connsiteY4" fmla="*/ 1054639 h 1054639"/>
+              <a:gd name="connsiteX5" fmla="*/ 0 w 3571100"/>
+              <a:gd name="connsiteY5" fmla="*/ 1054639 h 1054639"/>
+              <a:gd name="connsiteX6" fmla="*/ 0 w 3571100"/>
+              <a:gd name="connsiteY6" fmla="*/ 493431 h 1054639"/>
+              <a:gd name="connsiteX0" fmla="*/ 8313 w 3579413"/>
+              <a:gd name="connsiteY0" fmla="*/ 493431 h 1503527"/>
+              <a:gd name="connsiteX1" fmla="*/ 1991990 w 3579413"/>
+              <a:gd name="connsiteY1" fmla="*/ 482139 h 1503527"/>
+              <a:gd name="connsiteX2" fmla="*/ 1991990 w 3579413"/>
+              <a:gd name="connsiteY2" fmla="*/ 0 h 1503527"/>
+              <a:gd name="connsiteX3" fmla="*/ 3579413 w 3579413"/>
+              <a:gd name="connsiteY3" fmla="*/ 2980 h 1503527"/>
+              <a:gd name="connsiteX4" fmla="*/ 3562788 w 3579413"/>
+              <a:gd name="connsiteY4" fmla="*/ 1054639 h 1503527"/>
+              <a:gd name="connsiteX5" fmla="*/ 0 w 3579413"/>
+              <a:gd name="connsiteY5" fmla="*/ 1503527 h 1503527"/>
+              <a:gd name="connsiteX6" fmla="*/ 8313 w 3579413"/>
+              <a:gd name="connsiteY6" fmla="*/ 493431 h 1503527"/>
+              <a:gd name="connsiteX0" fmla="*/ 0 w 3579413"/>
+              <a:gd name="connsiteY0" fmla="*/ 1503527 h 1503527"/>
+              <a:gd name="connsiteX1" fmla="*/ 1991990 w 3579413"/>
+              <a:gd name="connsiteY1" fmla="*/ 482139 h 1503527"/>
+              <a:gd name="connsiteX2" fmla="*/ 1991990 w 3579413"/>
+              <a:gd name="connsiteY2" fmla="*/ 0 h 1503527"/>
+              <a:gd name="connsiteX3" fmla="*/ 3579413 w 3579413"/>
+              <a:gd name="connsiteY3" fmla="*/ 2980 h 1503527"/>
+              <a:gd name="connsiteX4" fmla="*/ 3562788 w 3579413"/>
+              <a:gd name="connsiteY4" fmla="*/ 1054639 h 1503527"/>
+              <a:gd name="connsiteX5" fmla="*/ 0 w 3579413"/>
+              <a:gd name="connsiteY5" fmla="*/ 1503527 h 1503527"/>
+              <a:gd name="connsiteX0" fmla="*/ 1570798 w 1587423"/>
+              <a:gd name="connsiteY0" fmla="*/ 1054639 h 1054639"/>
+              <a:gd name="connsiteX1" fmla="*/ 0 w 1587423"/>
+              <a:gd name="connsiteY1" fmla="*/ 482139 h 1054639"/>
+              <a:gd name="connsiteX2" fmla="*/ 0 w 1587423"/>
+              <a:gd name="connsiteY2" fmla="*/ 0 h 1054639"/>
+              <a:gd name="connsiteX3" fmla="*/ 1587423 w 1587423"/>
+              <a:gd name="connsiteY3" fmla="*/ 2980 h 1054639"/>
+              <a:gd name="connsiteX4" fmla="*/ 1570798 w 1587423"/>
+              <a:gd name="connsiteY4" fmla="*/ 1054639 h 1054639"/>
+              <a:gd name="connsiteX0" fmla="*/ 1595736 w 1612361"/>
+              <a:gd name="connsiteY0" fmla="*/ 1054639 h 1064030"/>
+              <a:gd name="connsiteX1" fmla="*/ 0 w 1612361"/>
+              <a:gd name="connsiteY1" fmla="*/ 1064030 h 1064030"/>
+              <a:gd name="connsiteX2" fmla="*/ 24938 w 1612361"/>
+              <a:gd name="connsiteY2" fmla="*/ 0 h 1064030"/>
+              <a:gd name="connsiteX3" fmla="*/ 1612361 w 1612361"/>
+              <a:gd name="connsiteY3" fmla="*/ 2980 h 1064030"/>
+              <a:gd name="connsiteX4" fmla="*/ 1595736 w 1612361"/>
+              <a:gd name="connsiteY4" fmla="*/ 1054639 h 1064030"/>
+              <a:gd name="connsiteX0" fmla="*/ 1595736 w 1612361"/>
+              <a:gd name="connsiteY0" fmla="*/ 1054639 h 1055717"/>
+              <a:gd name="connsiteX1" fmla="*/ 0 w 1612361"/>
+              <a:gd name="connsiteY1" fmla="*/ 1055717 h 1055717"/>
+              <a:gd name="connsiteX2" fmla="*/ 24938 w 1612361"/>
+              <a:gd name="connsiteY2" fmla="*/ 0 h 1055717"/>
+              <a:gd name="connsiteX3" fmla="*/ 1612361 w 1612361"/>
+              <a:gd name="connsiteY3" fmla="*/ 2980 h 1055717"/>
+              <a:gd name="connsiteX4" fmla="*/ 1595736 w 1612361"/>
+              <a:gd name="connsiteY4" fmla="*/ 1054639 h 1055717"/>
+              <a:gd name="connsiteX0" fmla="*/ 1570798 w 1587423"/>
+              <a:gd name="connsiteY0" fmla="*/ 1054639 h 1055717"/>
+              <a:gd name="connsiteX1" fmla="*/ 0 w 1587423"/>
+              <a:gd name="connsiteY1" fmla="*/ 1055717 h 1055717"/>
+              <a:gd name="connsiteX2" fmla="*/ 0 w 1587423"/>
+              <a:gd name="connsiteY2" fmla="*/ 0 h 1055717"/>
+              <a:gd name="connsiteX3" fmla="*/ 1587423 w 1587423"/>
+              <a:gd name="connsiteY3" fmla="*/ 2980 h 1055717"/>
+              <a:gd name="connsiteX4" fmla="*/ 1570798 w 1587423"/>
+              <a:gd name="connsiteY4" fmla="*/ 1054639 h 1055717"/>
+            </a:gdLst>
+            <a:ahLst/>
+            <a:cxnLst>
+              <a:cxn ang="0">
+                <a:pos x="connsiteX0" y="connsiteY0"/>
+              </a:cxn>
+              <a:cxn ang="0">
+                <a:pos x="connsiteX1" y="connsiteY1"/>
+              </a:cxn>
+              <a:cxn ang="0">
+                <a:pos x="connsiteX2" y="connsiteY2"/>
+              </a:cxn>
+              <a:cxn ang="0">
+                <a:pos x="connsiteX3" y="connsiteY3"/>
+              </a:cxn>
+              <a:cxn ang="0">
+                <a:pos x="connsiteX4" y="connsiteY4"/>
+              </a:cxn>
+            </a:cxnLst>
+            <a:rect l="l" t="t" r="r" b="b"/>
+            <a:pathLst>
+              <a:path w="1587423" h="1055717">
+                <a:moveTo>
+                  <a:pt x="1570798" y="1054639"/>
+                </a:moveTo>
+                <a:lnTo>
+                  <a:pt x="0" y="1055717"/>
+                </a:lnTo>
+                <a:lnTo>
+                  <a:pt x="0" y="0"/>
+                </a:lnTo>
+                <a:lnTo>
+                  <a:pt x="1587423" y="2980"/>
+                </a:lnTo>
+                <a:lnTo>
+                  <a:pt x="1570798" y="1054639"/>
+                </a:lnTo>
+                <a:close/>
+              </a:path>
+            </a:pathLst>
+          </a:custGeom>
+          <a:noFill/>
+          <a:ln w="28575"/>
+        </p:spPr>
+        <p:style>
+          <a:lnRef idx="2">
+            <a:schemeClr val="accent1">
+              <a:shade val="50000"/>
+            </a:schemeClr>
+          </a:lnRef>
+          <a:fillRef idx="1">
+            <a:schemeClr val="accent1"/>
+          </a:fillRef>
+          <a:effectRef idx="0">
+            <a:schemeClr val="accent1"/>
+          </a:effectRef>
+          <a:fontRef idx="minor">
+            <a:schemeClr val="lt1"/>
+          </a:fontRef>
+        </p:style>
+        <p:txBody>
+          <a:bodyPr rtlCol="0" anchor="ctr"/>
+          <a:lstStyle/>
+          <a:p>
+            <a:pPr algn="ctr"/>
+            <a:endParaRPr lang="en-US" dirty="0"/>
+          </a:p>
+        </p:txBody>
+      </p:sp>
+      <p:sp>
+        <p:nvSpPr>
+          <p:cNvPr id="17" name="Textfeld 16">
+            <a:extLst>
+              <a:ext uri="{FF2B5EF4-FFF2-40B4-BE49-F238E27FC236}">
+                <a16:creationId xmlns:a16="http://schemas.microsoft.com/office/drawing/2014/main" id="{A4391A83-445B-47FB-B6D7-C514A3D103DC}"/>
+              </a:ext>
+            </a:extLst>
+          </p:cNvPr>
+          <p:cNvSpPr txBox="1"/>
+          <p:nvPr/>
+        </p:nvSpPr>
+        <p:spPr>
+          <a:xfrm>
+            <a:off x="8314938" y="2006871"/>
+            <a:ext cx="1795941" cy="523220"/>
+          </a:xfrm>
+          <a:prstGeom prst="rect">
+            <a:avLst/>
+          </a:prstGeom>
+          <a:noFill/>
+        </p:spPr>
+        <p:txBody>
+          <a:bodyPr wrap="none" rtlCol="0">
+            <a:spAutoFit/>
+          </a:bodyPr>
+          <a:lstStyle/>
+          <a:p>
+            <a:r>
+              <a:rPr lang="en-US" sz="1400" b="1" dirty="0">
+                <a:solidFill>
+                  <a:srgbClr val="004489"/>
+                </a:solidFill>
+              </a:rPr>
+              <a:t>Reference to STEP file</a:t>
+            </a:r>
+            <a:br>
+              <a:rPr lang="en-US" sz="1400" b="1" dirty="0">
+                <a:solidFill>
+                  <a:srgbClr val="004489"/>
+                </a:solidFill>
+              </a:rPr>
+            </a:br>
+            <a:r>
+              <a:rPr lang="en-US" sz="1400" b="1" dirty="0">
+                <a:solidFill>
+                  <a:srgbClr val="004489"/>
+                </a:solidFill>
+              </a:rPr>
+              <a:t>(Geometry of Part A)</a:t>
+            </a:r>
+          </a:p>
+        </p:txBody>
+      </p:sp>
+      <p:sp>
+        <p:nvSpPr>
+          <p:cNvPr id="28" name="Textfeld 27">
+            <a:extLst>
+              <a:ext uri="{FF2B5EF4-FFF2-40B4-BE49-F238E27FC236}">
+                <a16:creationId xmlns:a16="http://schemas.microsoft.com/office/drawing/2014/main" id="{920E1A68-88BA-413D-8496-3F5C930BEFB3}"/>
+              </a:ext>
+            </a:extLst>
+          </p:cNvPr>
+          <p:cNvSpPr txBox="1"/>
+          <p:nvPr/>
+        </p:nvSpPr>
+        <p:spPr>
+          <a:xfrm>
+            <a:off x="2738609" y="4156264"/>
+            <a:ext cx="1146148" cy="307777"/>
+          </a:xfrm>
+          <a:prstGeom prst="rect">
+            <a:avLst/>
+          </a:prstGeom>
+          <a:noFill/>
+        </p:spPr>
+        <p:txBody>
+          <a:bodyPr wrap="none" rtlCol="0">
+            <a:spAutoFit/>
+          </a:bodyPr>
+          <a:lstStyle/>
+          <a:p>
+            <a:r>
+              <a:rPr lang="en-US" sz="1400" b="1" dirty="0">
+                <a:solidFill>
+                  <a:srgbClr val="004489"/>
+                </a:solidFill>
+              </a:rPr>
+              <a:t>Joined Part B</a:t>
+            </a:r>
+          </a:p>
+        </p:txBody>
+      </p:sp>
+      <p:sp>
+        <p:nvSpPr>
+          <p:cNvPr id="23" name="Freihandform 6">
+            <a:extLst>
+              <a:ext uri="{FF2B5EF4-FFF2-40B4-BE49-F238E27FC236}">
+                <a16:creationId xmlns:a16="http://schemas.microsoft.com/office/drawing/2014/main" id="{C72024C8-8C91-4742-ABD5-55A505764BCB}"/>
+              </a:ext>
+            </a:extLst>
+          </p:cNvPr>
+          <p:cNvSpPr/>
+          <p:nvPr/>
+        </p:nvSpPr>
+        <p:spPr>
+          <a:xfrm flipV="1">
+            <a:off x="2068272" y="3639220"/>
+            <a:ext cx="3436662" cy="1284861"/>
+          </a:xfrm>
+          <a:custGeom>
+            <a:avLst/>
+            <a:gdLst>
+              <a:gd name="connsiteX0" fmla="*/ 4206240 w 4206240"/>
+              <a:gd name="connsiteY0" fmla="*/ 91440 h 1795549"/>
+              <a:gd name="connsiteX1" fmla="*/ 4206240 w 4206240"/>
+              <a:gd name="connsiteY1" fmla="*/ 1795549 h 1795549"/>
+              <a:gd name="connsiteX2" fmla="*/ 0 w 4206240"/>
+              <a:gd name="connsiteY2" fmla="*/ 1795549 h 1795549"/>
+              <a:gd name="connsiteX3" fmla="*/ 0 w 4206240"/>
+              <a:gd name="connsiteY3" fmla="*/ 1221971 h 1795549"/>
+              <a:gd name="connsiteX4" fmla="*/ 1787236 w 4206240"/>
+              <a:gd name="connsiteY4" fmla="*/ 1221971 h 1795549"/>
+              <a:gd name="connsiteX5" fmla="*/ 1787236 w 4206240"/>
+              <a:gd name="connsiteY5" fmla="*/ 0 h 1795549"/>
+              <a:gd name="connsiteX6" fmla="*/ 4206240 w 4206240"/>
+              <a:gd name="connsiteY6" fmla="*/ 0 h 1795549"/>
+              <a:gd name="connsiteX7" fmla="*/ 4206240 w 4206240"/>
+              <a:gd name="connsiteY7" fmla="*/ 91440 h 1795549"/>
+              <a:gd name="connsiteX0" fmla="*/ 4206240 w 4206240"/>
+              <a:gd name="connsiteY0" fmla="*/ 91440 h 1795549"/>
+              <a:gd name="connsiteX1" fmla="*/ 4206240 w 4206240"/>
+              <a:gd name="connsiteY1" fmla="*/ 1795549 h 1795549"/>
+              <a:gd name="connsiteX2" fmla="*/ 0 w 4206240"/>
+              <a:gd name="connsiteY2" fmla="*/ 1795549 h 1795549"/>
+              <a:gd name="connsiteX3" fmla="*/ 0 w 4206240"/>
+              <a:gd name="connsiteY3" fmla="*/ 1221971 h 1795549"/>
+              <a:gd name="connsiteX4" fmla="*/ 2513920 w 4206240"/>
+              <a:gd name="connsiteY4" fmla="*/ 1205346 h 1795549"/>
+              <a:gd name="connsiteX5" fmla="*/ 1787236 w 4206240"/>
+              <a:gd name="connsiteY5" fmla="*/ 0 h 1795549"/>
+              <a:gd name="connsiteX6" fmla="*/ 4206240 w 4206240"/>
+              <a:gd name="connsiteY6" fmla="*/ 0 h 1795549"/>
+              <a:gd name="connsiteX7" fmla="*/ 4206240 w 4206240"/>
+              <a:gd name="connsiteY7" fmla="*/ 91440 h 1795549"/>
+              <a:gd name="connsiteX0" fmla="*/ 4206240 w 4206240"/>
+              <a:gd name="connsiteY0" fmla="*/ 91440 h 1795549"/>
+              <a:gd name="connsiteX1" fmla="*/ 4206240 w 4206240"/>
+              <a:gd name="connsiteY1" fmla="*/ 1795549 h 1795549"/>
+              <a:gd name="connsiteX2" fmla="*/ 0 w 4206240"/>
+              <a:gd name="connsiteY2" fmla="*/ 1795549 h 1795549"/>
+              <a:gd name="connsiteX3" fmla="*/ 0 w 4206240"/>
+              <a:gd name="connsiteY3" fmla="*/ 1221971 h 1795549"/>
+              <a:gd name="connsiteX4" fmla="*/ 2513920 w 4206240"/>
+              <a:gd name="connsiteY4" fmla="*/ 1205346 h 1795549"/>
+              <a:gd name="connsiteX5" fmla="*/ 2490480 w 4206240"/>
+              <a:gd name="connsiteY5" fmla="*/ 8313 h 1795549"/>
+              <a:gd name="connsiteX6" fmla="*/ 4206240 w 4206240"/>
+              <a:gd name="connsiteY6" fmla="*/ 0 h 1795549"/>
+              <a:gd name="connsiteX7" fmla="*/ 4206240 w 4206240"/>
+              <a:gd name="connsiteY7" fmla="*/ 91440 h 1795549"/>
+              <a:gd name="connsiteX0" fmla="*/ 4206240 w 4206240"/>
+              <a:gd name="connsiteY0" fmla="*/ 91440 h 1795549"/>
+              <a:gd name="connsiteX1" fmla="*/ 4206240 w 4206240"/>
+              <a:gd name="connsiteY1" fmla="*/ 1795549 h 1795549"/>
+              <a:gd name="connsiteX2" fmla="*/ 0 w 4206240"/>
+              <a:gd name="connsiteY2" fmla="*/ 1795549 h 1795549"/>
+              <a:gd name="connsiteX3" fmla="*/ 0 w 4206240"/>
+              <a:gd name="connsiteY3" fmla="*/ 1221971 h 1795549"/>
+              <a:gd name="connsiteX4" fmla="*/ 1605714 w 4206240"/>
+              <a:gd name="connsiteY4" fmla="*/ 1223647 h 1795549"/>
+              <a:gd name="connsiteX5" fmla="*/ 2490480 w 4206240"/>
+              <a:gd name="connsiteY5" fmla="*/ 8313 h 1795549"/>
+              <a:gd name="connsiteX6" fmla="*/ 4206240 w 4206240"/>
+              <a:gd name="connsiteY6" fmla="*/ 0 h 1795549"/>
+              <a:gd name="connsiteX7" fmla="*/ 4206240 w 4206240"/>
+              <a:gd name="connsiteY7" fmla="*/ 91440 h 1795549"/>
+              <a:gd name="connsiteX0" fmla="*/ 4206240 w 4206240"/>
+              <a:gd name="connsiteY0" fmla="*/ 91440 h 1795549"/>
+              <a:gd name="connsiteX1" fmla="*/ 4206240 w 4206240"/>
+              <a:gd name="connsiteY1" fmla="*/ 1795549 h 1795549"/>
+              <a:gd name="connsiteX2" fmla="*/ 0 w 4206240"/>
+              <a:gd name="connsiteY2" fmla="*/ 1795549 h 1795549"/>
+              <a:gd name="connsiteX3" fmla="*/ 0 w 4206240"/>
+              <a:gd name="connsiteY3" fmla="*/ 1221971 h 1795549"/>
+              <a:gd name="connsiteX4" fmla="*/ 1605714 w 4206240"/>
+              <a:gd name="connsiteY4" fmla="*/ 1223647 h 1795549"/>
+              <a:gd name="connsiteX5" fmla="*/ 1600259 w 4206240"/>
+              <a:gd name="connsiteY5" fmla="*/ 200481 h 1795549"/>
+              <a:gd name="connsiteX6" fmla="*/ 4206240 w 4206240"/>
+              <a:gd name="connsiteY6" fmla="*/ 0 h 1795549"/>
+              <a:gd name="connsiteX7" fmla="*/ 4206240 w 4206240"/>
+              <a:gd name="connsiteY7" fmla="*/ 91440 h 1795549"/>
+              <a:gd name="connsiteX0" fmla="*/ 4206240 w 4206240"/>
+              <a:gd name="connsiteY0" fmla="*/ 0 h 1704109"/>
+              <a:gd name="connsiteX1" fmla="*/ 4206240 w 4206240"/>
+              <a:gd name="connsiteY1" fmla="*/ 1704109 h 1704109"/>
+              <a:gd name="connsiteX2" fmla="*/ 0 w 4206240"/>
+              <a:gd name="connsiteY2" fmla="*/ 1704109 h 1704109"/>
+              <a:gd name="connsiteX3" fmla="*/ 0 w 4206240"/>
+              <a:gd name="connsiteY3" fmla="*/ 1130531 h 1704109"/>
+              <a:gd name="connsiteX4" fmla="*/ 1605714 w 4206240"/>
+              <a:gd name="connsiteY4" fmla="*/ 1132207 h 1704109"/>
+              <a:gd name="connsiteX5" fmla="*/ 1600259 w 4206240"/>
+              <a:gd name="connsiteY5" fmla="*/ 109041 h 1704109"/>
+              <a:gd name="connsiteX6" fmla="*/ 4206240 w 4206240"/>
+              <a:gd name="connsiteY6" fmla="*/ 91577 h 1704109"/>
+              <a:gd name="connsiteX7" fmla="*/ 4206240 w 4206240"/>
+              <a:gd name="connsiteY7" fmla="*/ 0 h 1704109"/>
+              <a:gd name="connsiteX0" fmla="*/ 4206240 w 4206240"/>
+              <a:gd name="connsiteY0" fmla="*/ -1 h 1612531"/>
+              <a:gd name="connsiteX1" fmla="*/ 4206240 w 4206240"/>
+              <a:gd name="connsiteY1" fmla="*/ 1612531 h 1612531"/>
+              <a:gd name="connsiteX2" fmla="*/ 0 w 4206240"/>
+              <a:gd name="connsiteY2" fmla="*/ 1612531 h 1612531"/>
+              <a:gd name="connsiteX3" fmla="*/ 0 w 4206240"/>
+              <a:gd name="connsiteY3" fmla="*/ 1038953 h 1612531"/>
+              <a:gd name="connsiteX4" fmla="*/ 1605714 w 4206240"/>
+              <a:gd name="connsiteY4" fmla="*/ 1040629 h 1612531"/>
+              <a:gd name="connsiteX5" fmla="*/ 1600259 w 4206240"/>
+              <a:gd name="connsiteY5" fmla="*/ 17463 h 1612531"/>
+              <a:gd name="connsiteX6" fmla="*/ 4206240 w 4206240"/>
+              <a:gd name="connsiteY6" fmla="*/ -1 h 1612531"/>
+              <a:gd name="connsiteX0" fmla="*/ 4206240 w 4206240"/>
+              <a:gd name="connsiteY0" fmla="*/ 0 h 1612532"/>
+              <a:gd name="connsiteX1" fmla="*/ 2803466 w 4206240"/>
+              <a:gd name="connsiteY1" fmla="*/ 1612532 h 1612532"/>
+              <a:gd name="connsiteX2" fmla="*/ 0 w 4206240"/>
+              <a:gd name="connsiteY2" fmla="*/ 1612532 h 1612532"/>
+              <a:gd name="connsiteX3" fmla="*/ 0 w 4206240"/>
+              <a:gd name="connsiteY3" fmla="*/ 1038954 h 1612532"/>
+              <a:gd name="connsiteX4" fmla="*/ 1605714 w 4206240"/>
+              <a:gd name="connsiteY4" fmla="*/ 1040630 h 1612532"/>
+              <a:gd name="connsiteX5" fmla="*/ 1600259 w 4206240"/>
+              <a:gd name="connsiteY5" fmla="*/ 17464 h 1612532"/>
+              <a:gd name="connsiteX6" fmla="*/ 4206240 w 4206240"/>
+              <a:gd name="connsiteY6" fmla="*/ 0 h 1612532"/>
+              <a:gd name="connsiteX0" fmla="*/ 2794474 w 2803466"/>
+              <a:gd name="connsiteY0" fmla="*/ 838 h 1595069"/>
+              <a:gd name="connsiteX1" fmla="*/ 2803466 w 2803466"/>
+              <a:gd name="connsiteY1" fmla="*/ 1595069 h 1595069"/>
+              <a:gd name="connsiteX2" fmla="*/ 0 w 2803466"/>
+              <a:gd name="connsiteY2" fmla="*/ 1595069 h 1595069"/>
+              <a:gd name="connsiteX3" fmla="*/ 0 w 2803466"/>
+              <a:gd name="connsiteY3" fmla="*/ 1021491 h 1595069"/>
+              <a:gd name="connsiteX4" fmla="*/ 1605714 w 2803466"/>
+              <a:gd name="connsiteY4" fmla="*/ 1023167 h 1595069"/>
+              <a:gd name="connsiteX5" fmla="*/ 1600259 w 2803466"/>
+              <a:gd name="connsiteY5" fmla="*/ 1 h 1595069"/>
+              <a:gd name="connsiteX6" fmla="*/ 2794474 w 2803466"/>
+              <a:gd name="connsiteY6" fmla="*/ 838 h 1595069"/>
+            </a:gdLst>
+            <a:ahLst/>
+            <a:cxnLst>
+              <a:cxn ang="0">
+                <a:pos x="connsiteX0" y="connsiteY0"/>
+              </a:cxn>
+              <a:cxn ang="0">
+                <a:pos x="connsiteX1" y="connsiteY1"/>
+              </a:cxn>
+              <a:cxn ang="0">
+                <a:pos x="connsiteX2" y="connsiteY2"/>
+              </a:cxn>
+              <a:cxn ang="0">
+                <a:pos x="connsiteX3" y="connsiteY3"/>
+              </a:cxn>
+              <a:cxn ang="0">
+                <a:pos x="connsiteX4" y="connsiteY4"/>
+              </a:cxn>
+              <a:cxn ang="0">
+                <a:pos x="connsiteX5" y="connsiteY5"/>
+              </a:cxn>
+              <a:cxn ang="0">
+                <a:pos x="connsiteX6" y="connsiteY6"/>
+              </a:cxn>
+            </a:cxnLst>
+            <a:rect l="l" t="t" r="r" b="b"/>
+            <a:pathLst>
+              <a:path w="2803466" h="1595069">
+                <a:moveTo>
+                  <a:pt x="2794474" y="838"/>
+                </a:moveTo>
+                <a:cubicBezTo>
+                  <a:pt x="2797471" y="532248"/>
+                  <a:pt x="2800469" y="1063659"/>
+                  <a:pt x="2803466" y="1595069"/>
+                </a:cubicBezTo>
+                <a:lnTo>
+                  <a:pt x="0" y="1595069"/>
+                </a:lnTo>
+                <a:lnTo>
+                  <a:pt x="0" y="1021491"/>
+                </a:lnTo>
+                <a:lnTo>
+                  <a:pt x="1605714" y="1023167"/>
+                </a:lnTo>
+                <a:cubicBezTo>
+                  <a:pt x="1603896" y="682112"/>
+                  <a:pt x="1602077" y="341056"/>
+                  <a:pt x="1600259" y="1"/>
+                </a:cubicBezTo>
+                <a:lnTo>
+                  <a:pt x="2794474" y="838"/>
+                </a:lnTo>
+                <a:close/>
+              </a:path>
+            </a:pathLst>
+          </a:custGeom>
+          <a:noFill/>
+          <a:ln w="28575"/>
+        </p:spPr>
+        <p:style>
+          <a:lnRef idx="2">
+            <a:schemeClr val="accent1">
+              <a:shade val="50000"/>
+            </a:schemeClr>
+          </a:lnRef>
+          <a:fillRef idx="1">
+            <a:schemeClr val="accent1"/>
+          </a:fillRef>
+          <a:effectRef idx="0">
+            <a:schemeClr val="accent1"/>
+          </a:effectRef>
+          <a:fontRef idx="minor">
+            <a:schemeClr val="lt1"/>
+          </a:fontRef>
+        </p:style>
+        <p:txBody>
+          <a:bodyPr rtlCol="0" anchor="ctr"/>
+          <a:lstStyle/>
+          <a:p>
+            <a:pPr algn="ctr"/>
+            <a:endParaRPr lang="en-US" dirty="0"/>
+          </a:p>
+        </p:txBody>
+      </p:sp>
+      <p:sp>
+        <p:nvSpPr>
+          <p:cNvPr id="24" name="Rechteck 12">
+            <a:extLst>
+              <a:ext uri="{FF2B5EF4-FFF2-40B4-BE49-F238E27FC236}">
+                <a16:creationId xmlns:a16="http://schemas.microsoft.com/office/drawing/2014/main" id="{4712405B-2FE3-4CD4-9880-6C97F3D618AE}"/>
+              </a:ext>
+            </a:extLst>
+          </p:cNvPr>
+          <p:cNvSpPr/>
+          <p:nvPr/>
+        </p:nvSpPr>
+        <p:spPr>
+          <a:xfrm>
+            <a:off x="5671752" y="3633044"/>
+            <a:ext cx="2564027" cy="1470454"/>
+          </a:xfrm>
+          <a:custGeom>
+            <a:avLst/>
+            <a:gdLst>
+              <a:gd name="connsiteX0" fmla="*/ 0 w 3064024"/>
+              <a:gd name="connsiteY0" fmla="*/ 0 h 561208"/>
+              <a:gd name="connsiteX1" fmla="*/ 3064024 w 3064024"/>
+              <a:gd name="connsiteY1" fmla="*/ 0 h 561208"/>
+              <a:gd name="connsiteX2" fmla="*/ 3064024 w 3064024"/>
+              <a:gd name="connsiteY2" fmla="*/ 561208 h 561208"/>
+              <a:gd name="connsiteX3" fmla="*/ 0 w 3064024"/>
+              <a:gd name="connsiteY3" fmla="*/ 561208 h 561208"/>
+              <a:gd name="connsiteX4" fmla="*/ 0 w 3064024"/>
+              <a:gd name="connsiteY4" fmla="*/ 0 h 561208"/>
+              <a:gd name="connsiteX0" fmla="*/ 0 w 3554475"/>
+              <a:gd name="connsiteY0" fmla="*/ 0 h 561208"/>
+              <a:gd name="connsiteX1" fmla="*/ 3064024 w 3554475"/>
+              <a:gd name="connsiteY1" fmla="*/ 0 h 561208"/>
+              <a:gd name="connsiteX2" fmla="*/ 3554475 w 3554475"/>
+              <a:gd name="connsiteY2" fmla="*/ 561208 h 561208"/>
+              <a:gd name="connsiteX3" fmla="*/ 0 w 3554475"/>
+              <a:gd name="connsiteY3" fmla="*/ 561208 h 561208"/>
+              <a:gd name="connsiteX4" fmla="*/ 0 w 3554475"/>
+              <a:gd name="connsiteY4" fmla="*/ 0 h 561208"/>
+              <a:gd name="connsiteX0" fmla="*/ 0 w 3571100"/>
+              <a:gd name="connsiteY0" fmla="*/ 490451 h 1051659"/>
+              <a:gd name="connsiteX1" fmla="*/ 3571100 w 3571100"/>
+              <a:gd name="connsiteY1" fmla="*/ 0 h 1051659"/>
+              <a:gd name="connsiteX2" fmla="*/ 3554475 w 3571100"/>
+              <a:gd name="connsiteY2" fmla="*/ 1051659 h 1051659"/>
+              <a:gd name="connsiteX3" fmla="*/ 0 w 3571100"/>
+              <a:gd name="connsiteY3" fmla="*/ 1051659 h 1051659"/>
+              <a:gd name="connsiteX4" fmla="*/ 0 w 3571100"/>
+              <a:gd name="connsiteY4" fmla="*/ 490451 h 1051659"/>
+              <a:gd name="connsiteX0" fmla="*/ 0 w 3571100"/>
+              <a:gd name="connsiteY0" fmla="*/ 490451 h 1051659"/>
+              <a:gd name="connsiteX1" fmla="*/ 1967052 w 3571100"/>
+              <a:gd name="connsiteY1" fmla="*/ 221464 h 1051659"/>
+              <a:gd name="connsiteX2" fmla="*/ 3571100 w 3571100"/>
+              <a:gd name="connsiteY2" fmla="*/ 0 h 1051659"/>
+              <a:gd name="connsiteX3" fmla="*/ 3554475 w 3571100"/>
+              <a:gd name="connsiteY3" fmla="*/ 1051659 h 1051659"/>
+              <a:gd name="connsiteX4" fmla="*/ 0 w 3571100"/>
+              <a:gd name="connsiteY4" fmla="*/ 1051659 h 1051659"/>
+              <a:gd name="connsiteX5" fmla="*/ 0 w 3571100"/>
+              <a:gd name="connsiteY5" fmla="*/ 490451 h 1051659"/>
+              <a:gd name="connsiteX0" fmla="*/ 0 w 3571100"/>
+              <a:gd name="connsiteY0" fmla="*/ 493431 h 1054639"/>
+              <a:gd name="connsiteX1" fmla="*/ 1983677 w 3571100"/>
+              <a:gd name="connsiteY1" fmla="*/ 0 h 1054639"/>
+              <a:gd name="connsiteX2" fmla="*/ 3571100 w 3571100"/>
+              <a:gd name="connsiteY2" fmla="*/ 2980 h 1054639"/>
+              <a:gd name="connsiteX3" fmla="*/ 3554475 w 3571100"/>
+              <a:gd name="connsiteY3" fmla="*/ 1054639 h 1054639"/>
+              <a:gd name="connsiteX4" fmla="*/ 0 w 3571100"/>
+              <a:gd name="connsiteY4" fmla="*/ 1054639 h 1054639"/>
+              <a:gd name="connsiteX5" fmla="*/ 0 w 3571100"/>
+              <a:gd name="connsiteY5" fmla="*/ 493431 h 1054639"/>
+              <a:gd name="connsiteX0" fmla="*/ 0 w 3571100"/>
+              <a:gd name="connsiteY0" fmla="*/ 493431 h 1054639"/>
+              <a:gd name="connsiteX1" fmla="*/ 1584667 w 3571100"/>
+              <a:gd name="connsiteY1" fmla="*/ 108066 h 1054639"/>
+              <a:gd name="connsiteX2" fmla="*/ 1983677 w 3571100"/>
+              <a:gd name="connsiteY2" fmla="*/ 0 h 1054639"/>
+              <a:gd name="connsiteX3" fmla="*/ 3571100 w 3571100"/>
+              <a:gd name="connsiteY3" fmla="*/ 2980 h 1054639"/>
+              <a:gd name="connsiteX4" fmla="*/ 3554475 w 3571100"/>
+              <a:gd name="connsiteY4" fmla="*/ 1054639 h 1054639"/>
+              <a:gd name="connsiteX5" fmla="*/ 0 w 3571100"/>
+              <a:gd name="connsiteY5" fmla="*/ 1054639 h 1054639"/>
+              <a:gd name="connsiteX6" fmla="*/ 0 w 3571100"/>
+              <a:gd name="connsiteY6" fmla="*/ 493431 h 1054639"/>
+              <a:gd name="connsiteX0" fmla="*/ 0 w 3571100"/>
+              <a:gd name="connsiteY0" fmla="*/ 493431 h 1054639"/>
+              <a:gd name="connsiteX1" fmla="*/ 1983677 w 3571100"/>
+              <a:gd name="connsiteY1" fmla="*/ 482139 h 1054639"/>
+              <a:gd name="connsiteX2" fmla="*/ 1983677 w 3571100"/>
+              <a:gd name="connsiteY2" fmla="*/ 0 h 1054639"/>
+              <a:gd name="connsiteX3" fmla="*/ 3571100 w 3571100"/>
+              <a:gd name="connsiteY3" fmla="*/ 2980 h 1054639"/>
+              <a:gd name="connsiteX4" fmla="*/ 3554475 w 3571100"/>
+              <a:gd name="connsiteY4" fmla="*/ 1054639 h 1054639"/>
+              <a:gd name="connsiteX5" fmla="*/ 0 w 3571100"/>
+              <a:gd name="connsiteY5" fmla="*/ 1054639 h 1054639"/>
+              <a:gd name="connsiteX6" fmla="*/ 0 w 3571100"/>
+              <a:gd name="connsiteY6" fmla="*/ 493431 h 1054639"/>
+              <a:gd name="connsiteX0" fmla="*/ 8313 w 3579413"/>
+              <a:gd name="connsiteY0" fmla="*/ 493431 h 1503527"/>
+              <a:gd name="connsiteX1" fmla="*/ 1991990 w 3579413"/>
+              <a:gd name="connsiteY1" fmla="*/ 482139 h 1503527"/>
+              <a:gd name="connsiteX2" fmla="*/ 1991990 w 3579413"/>
+              <a:gd name="connsiteY2" fmla="*/ 0 h 1503527"/>
+              <a:gd name="connsiteX3" fmla="*/ 3579413 w 3579413"/>
+              <a:gd name="connsiteY3" fmla="*/ 2980 h 1503527"/>
+              <a:gd name="connsiteX4" fmla="*/ 3562788 w 3579413"/>
+              <a:gd name="connsiteY4" fmla="*/ 1054639 h 1503527"/>
+              <a:gd name="connsiteX5" fmla="*/ 0 w 3579413"/>
+              <a:gd name="connsiteY5" fmla="*/ 1503527 h 1503527"/>
+              <a:gd name="connsiteX6" fmla="*/ 8313 w 3579413"/>
+              <a:gd name="connsiteY6" fmla="*/ 493431 h 1503527"/>
+              <a:gd name="connsiteX0" fmla="*/ 0 w 3579413"/>
+              <a:gd name="connsiteY0" fmla="*/ 1503527 h 1503527"/>
+              <a:gd name="connsiteX1" fmla="*/ 1991990 w 3579413"/>
+              <a:gd name="connsiteY1" fmla="*/ 482139 h 1503527"/>
+              <a:gd name="connsiteX2" fmla="*/ 1991990 w 3579413"/>
+              <a:gd name="connsiteY2" fmla="*/ 0 h 1503527"/>
+              <a:gd name="connsiteX3" fmla="*/ 3579413 w 3579413"/>
+              <a:gd name="connsiteY3" fmla="*/ 2980 h 1503527"/>
+              <a:gd name="connsiteX4" fmla="*/ 3562788 w 3579413"/>
+              <a:gd name="connsiteY4" fmla="*/ 1054639 h 1503527"/>
+              <a:gd name="connsiteX5" fmla="*/ 0 w 3579413"/>
+              <a:gd name="connsiteY5" fmla="*/ 1503527 h 1503527"/>
+              <a:gd name="connsiteX0" fmla="*/ 1570798 w 1587423"/>
+              <a:gd name="connsiteY0" fmla="*/ 1054639 h 1054639"/>
+              <a:gd name="connsiteX1" fmla="*/ 0 w 1587423"/>
+              <a:gd name="connsiteY1" fmla="*/ 482139 h 1054639"/>
+              <a:gd name="connsiteX2" fmla="*/ 0 w 1587423"/>
+              <a:gd name="connsiteY2" fmla="*/ 0 h 1054639"/>
+              <a:gd name="connsiteX3" fmla="*/ 1587423 w 1587423"/>
+              <a:gd name="connsiteY3" fmla="*/ 2980 h 1054639"/>
+              <a:gd name="connsiteX4" fmla="*/ 1570798 w 1587423"/>
+              <a:gd name="connsiteY4" fmla="*/ 1054639 h 1054639"/>
+              <a:gd name="connsiteX0" fmla="*/ 1595736 w 1612361"/>
+              <a:gd name="connsiteY0" fmla="*/ 1054639 h 1064030"/>
+              <a:gd name="connsiteX1" fmla="*/ 0 w 1612361"/>
+              <a:gd name="connsiteY1" fmla="*/ 1064030 h 1064030"/>
+              <a:gd name="connsiteX2" fmla="*/ 24938 w 1612361"/>
+              <a:gd name="connsiteY2" fmla="*/ 0 h 1064030"/>
+              <a:gd name="connsiteX3" fmla="*/ 1612361 w 1612361"/>
+              <a:gd name="connsiteY3" fmla="*/ 2980 h 1064030"/>
+              <a:gd name="connsiteX4" fmla="*/ 1595736 w 1612361"/>
+              <a:gd name="connsiteY4" fmla="*/ 1054639 h 1064030"/>
+              <a:gd name="connsiteX0" fmla="*/ 1595736 w 1612361"/>
+              <a:gd name="connsiteY0" fmla="*/ 1054639 h 1055717"/>
+              <a:gd name="connsiteX1" fmla="*/ 0 w 1612361"/>
+              <a:gd name="connsiteY1" fmla="*/ 1055717 h 1055717"/>
+              <a:gd name="connsiteX2" fmla="*/ 24938 w 1612361"/>
+              <a:gd name="connsiteY2" fmla="*/ 0 h 1055717"/>
+              <a:gd name="connsiteX3" fmla="*/ 1612361 w 1612361"/>
+              <a:gd name="connsiteY3" fmla="*/ 2980 h 1055717"/>
+              <a:gd name="connsiteX4" fmla="*/ 1595736 w 1612361"/>
+              <a:gd name="connsiteY4" fmla="*/ 1054639 h 1055717"/>
+              <a:gd name="connsiteX0" fmla="*/ 1570798 w 1587423"/>
+              <a:gd name="connsiteY0" fmla="*/ 1054639 h 1055717"/>
+              <a:gd name="connsiteX1" fmla="*/ 0 w 1587423"/>
+              <a:gd name="connsiteY1" fmla="*/ 1055717 h 1055717"/>
+              <a:gd name="connsiteX2" fmla="*/ 0 w 1587423"/>
+              <a:gd name="connsiteY2" fmla="*/ 0 h 1055717"/>
+              <a:gd name="connsiteX3" fmla="*/ 1587423 w 1587423"/>
+              <a:gd name="connsiteY3" fmla="*/ 2980 h 1055717"/>
+              <a:gd name="connsiteX4" fmla="*/ 1570798 w 1587423"/>
+              <a:gd name="connsiteY4" fmla="*/ 1054639 h 1055717"/>
+            </a:gdLst>
+            <a:ahLst/>
+            <a:cxnLst>
+              <a:cxn ang="0">
+                <a:pos x="connsiteX0" y="connsiteY0"/>
+              </a:cxn>
+              <a:cxn ang="0">
+                <a:pos x="connsiteX1" y="connsiteY1"/>
+              </a:cxn>
+              <a:cxn ang="0">
+                <a:pos x="connsiteX2" y="connsiteY2"/>
+              </a:cxn>
+              <a:cxn ang="0">
+                <a:pos x="connsiteX3" y="connsiteY3"/>
+              </a:cxn>
+              <a:cxn ang="0">
+                <a:pos x="connsiteX4" y="connsiteY4"/>
+              </a:cxn>
+            </a:cxnLst>
+            <a:rect l="l" t="t" r="r" b="b"/>
+            <a:pathLst>
+              <a:path w="1587423" h="1055717">
+                <a:moveTo>
+                  <a:pt x="1570798" y="1054639"/>
+                </a:moveTo>
+                <a:lnTo>
+                  <a:pt x="0" y="1055717"/>
+                </a:lnTo>
+                <a:lnTo>
+                  <a:pt x="0" y="0"/>
+                </a:lnTo>
+                <a:lnTo>
+                  <a:pt x="1587423" y="2980"/>
+                </a:lnTo>
+                <a:lnTo>
+                  <a:pt x="1570798" y="1054639"/>
+                </a:lnTo>
+                <a:close/>
+              </a:path>
+            </a:pathLst>
+          </a:custGeom>
+          <a:noFill/>
+          <a:ln w="28575"/>
+        </p:spPr>
+        <p:style>
+          <a:lnRef idx="2">
+            <a:schemeClr val="accent1">
+              <a:shade val="50000"/>
+            </a:schemeClr>
+          </a:lnRef>
+          <a:fillRef idx="1">
+            <a:schemeClr val="accent1"/>
+          </a:fillRef>
+          <a:effectRef idx="0">
+            <a:schemeClr val="accent1"/>
+          </a:effectRef>
+          <a:fontRef idx="minor">
+            <a:schemeClr val="lt1"/>
+          </a:fontRef>
+        </p:style>
+        <p:txBody>
+          <a:bodyPr rtlCol="0" anchor="ctr"/>
+          <a:lstStyle/>
+          <a:p>
+            <a:pPr algn="ctr"/>
+            <a:endParaRPr lang="en-US" dirty="0"/>
+          </a:p>
+        </p:txBody>
+      </p:sp>
+      <p:sp>
+        <p:nvSpPr>
+          <p:cNvPr id="25" name="Freihandform 6">
+            <a:extLst>
+              <a:ext uri="{FF2B5EF4-FFF2-40B4-BE49-F238E27FC236}">
+                <a16:creationId xmlns:a16="http://schemas.microsoft.com/office/drawing/2014/main" id="{74214ED2-BB59-47C2-A475-BFBDB9646DED}"/>
+              </a:ext>
+            </a:extLst>
+          </p:cNvPr>
+          <p:cNvSpPr/>
+          <p:nvPr/>
+        </p:nvSpPr>
+        <p:spPr>
+          <a:xfrm flipV="1">
+            <a:off x="2068271" y="5259126"/>
+            <a:ext cx="3424305" cy="1284861"/>
+          </a:xfrm>
+          <a:custGeom>
+            <a:avLst/>
+            <a:gdLst>
+              <a:gd name="connsiteX0" fmla="*/ 4206240 w 4206240"/>
+              <a:gd name="connsiteY0" fmla="*/ 91440 h 1795549"/>
+              <a:gd name="connsiteX1" fmla="*/ 4206240 w 4206240"/>
+              <a:gd name="connsiteY1" fmla="*/ 1795549 h 1795549"/>
+              <a:gd name="connsiteX2" fmla="*/ 0 w 4206240"/>
+              <a:gd name="connsiteY2" fmla="*/ 1795549 h 1795549"/>
+              <a:gd name="connsiteX3" fmla="*/ 0 w 4206240"/>
+              <a:gd name="connsiteY3" fmla="*/ 1221971 h 1795549"/>
+              <a:gd name="connsiteX4" fmla="*/ 1787236 w 4206240"/>
+              <a:gd name="connsiteY4" fmla="*/ 1221971 h 1795549"/>
+              <a:gd name="connsiteX5" fmla="*/ 1787236 w 4206240"/>
+              <a:gd name="connsiteY5" fmla="*/ 0 h 1795549"/>
+              <a:gd name="connsiteX6" fmla="*/ 4206240 w 4206240"/>
+              <a:gd name="connsiteY6" fmla="*/ 0 h 1795549"/>
+              <a:gd name="connsiteX7" fmla="*/ 4206240 w 4206240"/>
+              <a:gd name="connsiteY7" fmla="*/ 91440 h 1795549"/>
+              <a:gd name="connsiteX0" fmla="*/ 4206240 w 4206240"/>
+              <a:gd name="connsiteY0" fmla="*/ 91440 h 1795549"/>
+              <a:gd name="connsiteX1" fmla="*/ 4206240 w 4206240"/>
+              <a:gd name="connsiteY1" fmla="*/ 1795549 h 1795549"/>
+              <a:gd name="connsiteX2" fmla="*/ 0 w 4206240"/>
+              <a:gd name="connsiteY2" fmla="*/ 1795549 h 1795549"/>
+              <a:gd name="connsiteX3" fmla="*/ 0 w 4206240"/>
+              <a:gd name="connsiteY3" fmla="*/ 1221971 h 1795549"/>
+              <a:gd name="connsiteX4" fmla="*/ 2513920 w 4206240"/>
+              <a:gd name="connsiteY4" fmla="*/ 1205346 h 1795549"/>
+              <a:gd name="connsiteX5" fmla="*/ 1787236 w 4206240"/>
+              <a:gd name="connsiteY5" fmla="*/ 0 h 1795549"/>
+              <a:gd name="connsiteX6" fmla="*/ 4206240 w 4206240"/>
+              <a:gd name="connsiteY6" fmla="*/ 0 h 1795549"/>
+              <a:gd name="connsiteX7" fmla="*/ 4206240 w 4206240"/>
+              <a:gd name="connsiteY7" fmla="*/ 91440 h 1795549"/>
+              <a:gd name="connsiteX0" fmla="*/ 4206240 w 4206240"/>
+              <a:gd name="connsiteY0" fmla="*/ 91440 h 1795549"/>
+              <a:gd name="connsiteX1" fmla="*/ 4206240 w 4206240"/>
+              <a:gd name="connsiteY1" fmla="*/ 1795549 h 1795549"/>
+              <a:gd name="connsiteX2" fmla="*/ 0 w 4206240"/>
+              <a:gd name="connsiteY2" fmla="*/ 1795549 h 1795549"/>
+              <a:gd name="connsiteX3" fmla="*/ 0 w 4206240"/>
+              <a:gd name="connsiteY3" fmla="*/ 1221971 h 1795549"/>
+              <a:gd name="connsiteX4" fmla="*/ 2513920 w 4206240"/>
+              <a:gd name="connsiteY4" fmla="*/ 1205346 h 1795549"/>
+              <a:gd name="connsiteX5" fmla="*/ 2490480 w 4206240"/>
+              <a:gd name="connsiteY5" fmla="*/ 8313 h 1795549"/>
+              <a:gd name="connsiteX6" fmla="*/ 4206240 w 4206240"/>
+              <a:gd name="connsiteY6" fmla="*/ 0 h 1795549"/>
+              <a:gd name="connsiteX7" fmla="*/ 4206240 w 4206240"/>
+              <a:gd name="connsiteY7" fmla="*/ 91440 h 1795549"/>
+              <a:gd name="connsiteX0" fmla="*/ 4206240 w 4206240"/>
+              <a:gd name="connsiteY0" fmla="*/ 91440 h 1795549"/>
+              <a:gd name="connsiteX1" fmla="*/ 4206240 w 4206240"/>
+              <a:gd name="connsiteY1" fmla="*/ 1795549 h 1795549"/>
+              <a:gd name="connsiteX2" fmla="*/ 0 w 4206240"/>
+              <a:gd name="connsiteY2" fmla="*/ 1795549 h 1795549"/>
+              <a:gd name="connsiteX3" fmla="*/ 0 w 4206240"/>
+              <a:gd name="connsiteY3" fmla="*/ 1221971 h 1795549"/>
+              <a:gd name="connsiteX4" fmla="*/ 1605714 w 4206240"/>
+              <a:gd name="connsiteY4" fmla="*/ 1223647 h 1795549"/>
+              <a:gd name="connsiteX5" fmla="*/ 2490480 w 4206240"/>
+              <a:gd name="connsiteY5" fmla="*/ 8313 h 1795549"/>
+              <a:gd name="connsiteX6" fmla="*/ 4206240 w 4206240"/>
+              <a:gd name="connsiteY6" fmla="*/ 0 h 1795549"/>
+              <a:gd name="connsiteX7" fmla="*/ 4206240 w 4206240"/>
+              <a:gd name="connsiteY7" fmla="*/ 91440 h 1795549"/>
+              <a:gd name="connsiteX0" fmla="*/ 4206240 w 4206240"/>
+              <a:gd name="connsiteY0" fmla="*/ 91440 h 1795549"/>
+              <a:gd name="connsiteX1" fmla="*/ 4206240 w 4206240"/>
+              <a:gd name="connsiteY1" fmla="*/ 1795549 h 1795549"/>
+              <a:gd name="connsiteX2" fmla="*/ 0 w 4206240"/>
+              <a:gd name="connsiteY2" fmla="*/ 1795549 h 1795549"/>
+              <a:gd name="connsiteX3" fmla="*/ 0 w 4206240"/>
+              <a:gd name="connsiteY3" fmla="*/ 1221971 h 1795549"/>
+              <a:gd name="connsiteX4" fmla="*/ 1605714 w 4206240"/>
+              <a:gd name="connsiteY4" fmla="*/ 1223647 h 1795549"/>
+              <a:gd name="connsiteX5" fmla="*/ 1600259 w 4206240"/>
+              <a:gd name="connsiteY5" fmla="*/ 200481 h 1795549"/>
+              <a:gd name="connsiteX6" fmla="*/ 4206240 w 4206240"/>
+              <a:gd name="connsiteY6" fmla="*/ 0 h 1795549"/>
+              <a:gd name="connsiteX7" fmla="*/ 4206240 w 4206240"/>
+              <a:gd name="connsiteY7" fmla="*/ 91440 h 1795549"/>
+              <a:gd name="connsiteX0" fmla="*/ 4206240 w 4206240"/>
+              <a:gd name="connsiteY0" fmla="*/ 0 h 1704109"/>
+              <a:gd name="connsiteX1" fmla="*/ 4206240 w 4206240"/>
+              <a:gd name="connsiteY1" fmla="*/ 1704109 h 1704109"/>
+              <a:gd name="connsiteX2" fmla="*/ 0 w 4206240"/>
+              <a:gd name="connsiteY2" fmla="*/ 1704109 h 1704109"/>
+              <a:gd name="connsiteX3" fmla="*/ 0 w 4206240"/>
+              <a:gd name="connsiteY3" fmla="*/ 1130531 h 1704109"/>
+              <a:gd name="connsiteX4" fmla="*/ 1605714 w 4206240"/>
+              <a:gd name="connsiteY4" fmla="*/ 1132207 h 1704109"/>
+              <a:gd name="connsiteX5" fmla="*/ 1600259 w 4206240"/>
+              <a:gd name="connsiteY5" fmla="*/ 109041 h 1704109"/>
+              <a:gd name="connsiteX6" fmla="*/ 4206240 w 4206240"/>
+              <a:gd name="connsiteY6" fmla="*/ 91577 h 1704109"/>
+              <a:gd name="connsiteX7" fmla="*/ 4206240 w 4206240"/>
+              <a:gd name="connsiteY7" fmla="*/ 0 h 1704109"/>
+              <a:gd name="connsiteX0" fmla="*/ 4206240 w 4206240"/>
+              <a:gd name="connsiteY0" fmla="*/ -1 h 1612531"/>
+              <a:gd name="connsiteX1" fmla="*/ 4206240 w 4206240"/>
+              <a:gd name="connsiteY1" fmla="*/ 1612531 h 1612531"/>
+              <a:gd name="connsiteX2" fmla="*/ 0 w 4206240"/>
+              <a:gd name="connsiteY2" fmla="*/ 1612531 h 1612531"/>
+              <a:gd name="connsiteX3" fmla="*/ 0 w 4206240"/>
+              <a:gd name="connsiteY3" fmla="*/ 1038953 h 1612531"/>
+              <a:gd name="connsiteX4" fmla="*/ 1605714 w 4206240"/>
+              <a:gd name="connsiteY4" fmla="*/ 1040629 h 1612531"/>
+              <a:gd name="connsiteX5" fmla="*/ 1600259 w 4206240"/>
+              <a:gd name="connsiteY5" fmla="*/ 17463 h 1612531"/>
+              <a:gd name="connsiteX6" fmla="*/ 4206240 w 4206240"/>
+              <a:gd name="connsiteY6" fmla="*/ -1 h 1612531"/>
+              <a:gd name="connsiteX0" fmla="*/ 4206240 w 4206240"/>
+              <a:gd name="connsiteY0" fmla="*/ 0 h 1612532"/>
+              <a:gd name="connsiteX1" fmla="*/ 2803466 w 4206240"/>
+              <a:gd name="connsiteY1" fmla="*/ 1612532 h 1612532"/>
+              <a:gd name="connsiteX2" fmla="*/ 0 w 4206240"/>
+              <a:gd name="connsiteY2" fmla="*/ 1612532 h 1612532"/>
+              <a:gd name="connsiteX3" fmla="*/ 0 w 4206240"/>
+              <a:gd name="connsiteY3" fmla="*/ 1038954 h 1612532"/>
+              <a:gd name="connsiteX4" fmla="*/ 1605714 w 4206240"/>
+              <a:gd name="connsiteY4" fmla="*/ 1040630 h 1612532"/>
+              <a:gd name="connsiteX5" fmla="*/ 1600259 w 4206240"/>
+              <a:gd name="connsiteY5" fmla="*/ 17464 h 1612532"/>
+              <a:gd name="connsiteX6" fmla="*/ 4206240 w 4206240"/>
+              <a:gd name="connsiteY6" fmla="*/ 0 h 1612532"/>
+              <a:gd name="connsiteX0" fmla="*/ 2794474 w 2803466"/>
+              <a:gd name="connsiteY0" fmla="*/ 838 h 1595069"/>
+              <a:gd name="connsiteX1" fmla="*/ 2803466 w 2803466"/>
+              <a:gd name="connsiteY1" fmla="*/ 1595069 h 1595069"/>
+              <a:gd name="connsiteX2" fmla="*/ 0 w 2803466"/>
+              <a:gd name="connsiteY2" fmla="*/ 1595069 h 1595069"/>
+              <a:gd name="connsiteX3" fmla="*/ 0 w 2803466"/>
+              <a:gd name="connsiteY3" fmla="*/ 1021491 h 1595069"/>
+              <a:gd name="connsiteX4" fmla="*/ 1605714 w 2803466"/>
+              <a:gd name="connsiteY4" fmla="*/ 1023167 h 1595069"/>
+              <a:gd name="connsiteX5" fmla="*/ 1600259 w 2803466"/>
+              <a:gd name="connsiteY5" fmla="*/ 1 h 1595069"/>
+              <a:gd name="connsiteX6" fmla="*/ 2794474 w 2803466"/>
+              <a:gd name="connsiteY6" fmla="*/ 838 h 1595069"/>
+            </a:gdLst>
+            <a:ahLst/>
+            <a:cxnLst>
+              <a:cxn ang="0">
+                <a:pos x="connsiteX0" y="connsiteY0"/>
+              </a:cxn>
+              <a:cxn ang="0">
+                <a:pos x="connsiteX1" y="connsiteY1"/>
+              </a:cxn>
+              <a:cxn ang="0">
+                <a:pos x="connsiteX2" y="connsiteY2"/>
+              </a:cxn>
+              <a:cxn ang="0">
+                <a:pos x="connsiteX3" y="connsiteY3"/>
+              </a:cxn>
+              <a:cxn ang="0">
+                <a:pos x="connsiteX4" y="connsiteY4"/>
+              </a:cxn>
+              <a:cxn ang="0">
+                <a:pos x="connsiteX5" y="connsiteY5"/>
+              </a:cxn>
+              <a:cxn ang="0">
+                <a:pos x="connsiteX6" y="connsiteY6"/>
+              </a:cxn>
+            </a:cxnLst>
+            <a:rect l="l" t="t" r="r" b="b"/>
+            <a:pathLst>
+              <a:path w="2803466" h="1595069">
+                <a:moveTo>
+                  <a:pt x="2794474" y="838"/>
+                </a:moveTo>
+                <a:cubicBezTo>
+                  <a:pt x="2797471" y="532248"/>
+                  <a:pt x="2800469" y="1063659"/>
+                  <a:pt x="2803466" y="1595069"/>
+                </a:cubicBezTo>
+                <a:lnTo>
+                  <a:pt x="0" y="1595069"/>
+                </a:lnTo>
+                <a:lnTo>
+                  <a:pt x="0" y="1021491"/>
+                </a:lnTo>
+                <a:lnTo>
+                  <a:pt x="1605714" y="1023167"/>
+                </a:lnTo>
+                <a:cubicBezTo>
+                  <a:pt x="1603896" y="682112"/>
+                  <a:pt x="1602077" y="341056"/>
+                  <a:pt x="1600259" y="1"/>
+                </a:cubicBezTo>
+                <a:lnTo>
+                  <a:pt x="2794474" y="838"/>
+                </a:lnTo>
+                <a:close/>
+              </a:path>
+            </a:pathLst>
+          </a:custGeom>
+          <a:noFill/>
+          <a:ln w="28575"/>
+        </p:spPr>
+        <p:style>
+          <a:lnRef idx="2">
+            <a:schemeClr val="accent1">
+              <a:shade val="50000"/>
+            </a:schemeClr>
+          </a:lnRef>
+          <a:fillRef idx="1">
+            <a:schemeClr val="accent1"/>
+          </a:fillRef>
+          <a:effectRef idx="0">
+            <a:schemeClr val="accent1"/>
+          </a:effectRef>
+          <a:fontRef idx="minor">
+            <a:schemeClr val="lt1"/>
+          </a:fontRef>
+        </p:style>
+        <p:txBody>
+          <a:bodyPr rtlCol="0" anchor="ctr"/>
+          <a:lstStyle/>
+          <a:p>
+            <a:pPr algn="ctr"/>
+            <a:endParaRPr lang="en-US" dirty="0"/>
+          </a:p>
+        </p:txBody>
+      </p:sp>
+      <p:sp>
+        <p:nvSpPr>
+          <p:cNvPr id="26" name="Rechteck 12">
+            <a:extLst>
+              <a:ext uri="{FF2B5EF4-FFF2-40B4-BE49-F238E27FC236}">
+                <a16:creationId xmlns:a16="http://schemas.microsoft.com/office/drawing/2014/main" id="{BB243260-3BD9-45D6-BFFF-78F1779440F3}"/>
+              </a:ext>
+            </a:extLst>
+          </p:cNvPr>
+          <p:cNvSpPr/>
+          <p:nvPr/>
+        </p:nvSpPr>
+        <p:spPr>
+          <a:xfrm>
+            <a:off x="5671752" y="5252950"/>
+            <a:ext cx="2564027" cy="1470454"/>
+          </a:xfrm>
+          <a:custGeom>
+            <a:avLst/>
+            <a:gdLst>
+              <a:gd name="connsiteX0" fmla="*/ 0 w 3064024"/>
+              <a:gd name="connsiteY0" fmla="*/ 0 h 561208"/>
+              <a:gd name="connsiteX1" fmla="*/ 3064024 w 3064024"/>
+              <a:gd name="connsiteY1" fmla="*/ 0 h 561208"/>
+              <a:gd name="connsiteX2" fmla="*/ 3064024 w 3064024"/>
+              <a:gd name="connsiteY2" fmla="*/ 561208 h 561208"/>
+              <a:gd name="connsiteX3" fmla="*/ 0 w 3064024"/>
+              <a:gd name="connsiteY3" fmla="*/ 561208 h 561208"/>
+              <a:gd name="connsiteX4" fmla="*/ 0 w 3064024"/>
+              <a:gd name="connsiteY4" fmla="*/ 0 h 561208"/>
+              <a:gd name="connsiteX0" fmla="*/ 0 w 3554475"/>
+              <a:gd name="connsiteY0" fmla="*/ 0 h 561208"/>
+              <a:gd name="connsiteX1" fmla="*/ 3064024 w 3554475"/>
+              <a:gd name="connsiteY1" fmla="*/ 0 h 561208"/>
+              <a:gd name="connsiteX2" fmla="*/ 3554475 w 3554475"/>
+              <a:gd name="connsiteY2" fmla="*/ 561208 h 561208"/>
+              <a:gd name="connsiteX3" fmla="*/ 0 w 3554475"/>
+              <a:gd name="connsiteY3" fmla="*/ 561208 h 561208"/>
+              <a:gd name="connsiteX4" fmla="*/ 0 w 3554475"/>
+              <a:gd name="connsiteY4" fmla="*/ 0 h 561208"/>
+              <a:gd name="connsiteX0" fmla="*/ 0 w 3571100"/>
+              <a:gd name="connsiteY0" fmla="*/ 490451 h 1051659"/>
+              <a:gd name="connsiteX1" fmla="*/ 3571100 w 3571100"/>
+              <a:gd name="connsiteY1" fmla="*/ 0 h 1051659"/>
+              <a:gd name="connsiteX2" fmla="*/ 3554475 w 3571100"/>
+              <a:gd name="connsiteY2" fmla="*/ 1051659 h 1051659"/>
+              <a:gd name="connsiteX3" fmla="*/ 0 w 3571100"/>
+              <a:gd name="connsiteY3" fmla="*/ 1051659 h 1051659"/>
+              <a:gd name="connsiteX4" fmla="*/ 0 w 3571100"/>
+              <a:gd name="connsiteY4" fmla="*/ 490451 h 1051659"/>
+              <a:gd name="connsiteX0" fmla="*/ 0 w 3571100"/>
+              <a:gd name="connsiteY0" fmla="*/ 490451 h 1051659"/>
+              <a:gd name="connsiteX1" fmla="*/ 1967052 w 3571100"/>
+              <a:gd name="connsiteY1" fmla="*/ 221464 h 1051659"/>
+              <a:gd name="connsiteX2" fmla="*/ 3571100 w 3571100"/>
+              <a:gd name="connsiteY2" fmla="*/ 0 h 1051659"/>
+              <a:gd name="connsiteX3" fmla="*/ 3554475 w 3571100"/>
+              <a:gd name="connsiteY3" fmla="*/ 1051659 h 1051659"/>
+              <a:gd name="connsiteX4" fmla="*/ 0 w 3571100"/>
+              <a:gd name="connsiteY4" fmla="*/ 1051659 h 1051659"/>
+              <a:gd name="connsiteX5" fmla="*/ 0 w 3571100"/>
+              <a:gd name="connsiteY5" fmla="*/ 490451 h 1051659"/>
+              <a:gd name="connsiteX0" fmla="*/ 0 w 3571100"/>
+              <a:gd name="connsiteY0" fmla="*/ 493431 h 1054639"/>
+              <a:gd name="connsiteX1" fmla="*/ 1983677 w 3571100"/>
+              <a:gd name="connsiteY1" fmla="*/ 0 h 1054639"/>
+              <a:gd name="connsiteX2" fmla="*/ 3571100 w 3571100"/>
+              <a:gd name="connsiteY2" fmla="*/ 2980 h 1054639"/>
+              <a:gd name="connsiteX3" fmla="*/ 3554475 w 3571100"/>
+              <a:gd name="connsiteY3" fmla="*/ 1054639 h 1054639"/>
+              <a:gd name="connsiteX4" fmla="*/ 0 w 3571100"/>
+              <a:gd name="connsiteY4" fmla="*/ 1054639 h 1054639"/>
+              <a:gd name="connsiteX5" fmla="*/ 0 w 3571100"/>
+              <a:gd name="connsiteY5" fmla="*/ 493431 h 1054639"/>
+              <a:gd name="connsiteX0" fmla="*/ 0 w 3571100"/>
+              <a:gd name="connsiteY0" fmla="*/ 493431 h 1054639"/>
+              <a:gd name="connsiteX1" fmla="*/ 1584667 w 3571100"/>
+              <a:gd name="connsiteY1" fmla="*/ 108066 h 1054639"/>
+              <a:gd name="connsiteX2" fmla="*/ 1983677 w 3571100"/>
+              <a:gd name="connsiteY2" fmla="*/ 0 h 1054639"/>
+              <a:gd name="connsiteX3" fmla="*/ 3571100 w 3571100"/>
+              <a:gd name="connsiteY3" fmla="*/ 2980 h 1054639"/>
+              <a:gd name="connsiteX4" fmla="*/ 3554475 w 3571100"/>
+              <a:gd name="connsiteY4" fmla="*/ 1054639 h 1054639"/>
+              <a:gd name="connsiteX5" fmla="*/ 0 w 3571100"/>
+              <a:gd name="connsiteY5" fmla="*/ 1054639 h 1054639"/>
+              <a:gd name="connsiteX6" fmla="*/ 0 w 3571100"/>
+              <a:gd name="connsiteY6" fmla="*/ 493431 h 1054639"/>
+              <a:gd name="connsiteX0" fmla="*/ 0 w 3571100"/>
+              <a:gd name="connsiteY0" fmla="*/ 493431 h 1054639"/>
+              <a:gd name="connsiteX1" fmla="*/ 1983677 w 3571100"/>
+              <a:gd name="connsiteY1" fmla="*/ 482139 h 1054639"/>
+              <a:gd name="connsiteX2" fmla="*/ 1983677 w 3571100"/>
+              <a:gd name="connsiteY2" fmla="*/ 0 h 1054639"/>
+              <a:gd name="connsiteX3" fmla="*/ 3571100 w 3571100"/>
+              <a:gd name="connsiteY3" fmla="*/ 2980 h 1054639"/>
+              <a:gd name="connsiteX4" fmla="*/ 3554475 w 3571100"/>
+              <a:gd name="connsiteY4" fmla="*/ 1054639 h 1054639"/>
+              <a:gd name="connsiteX5" fmla="*/ 0 w 3571100"/>
+              <a:gd name="connsiteY5" fmla="*/ 1054639 h 1054639"/>
+              <a:gd name="connsiteX6" fmla="*/ 0 w 3571100"/>
+              <a:gd name="connsiteY6" fmla="*/ 493431 h 1054639"/>
+              <a:gd name="connsiteX0" fmla="*/ 8313 w 3579413"/>
+              <a:gd name="connsiteY0" fmla="*/ 493431 h 1503527"/>
+              <a:gd name="connsiteX1" fmla="*/ 1991990 w 3579413"/>
+              <a:gd name="connsiteY1" fmla="*/ 482139 h 1503527"/>
+              <a:gd name="connsiteX2" fmla="*/ 1991990 w 3579413"/>
+              <a:gd name="connsiteY2" fmla="*/ 0 h 1503527"/>
+              <a:gd name="connsiteX3" fmla="*/ 3579413 w 3579413"/>
+              <a:gd name="connsiteY3" fmla="*/ 2980 h 1503527"/>
+              <a:gd name="connsiteX4" fmla="*/ 3562788 w 3579413"/>
+              <a:gd name="connsiteY4" fmla="*/ 1054639 h 1503527"/>
+              <a:gd name="connsiteX5" fmla="*/ 0 w 3579413"/>
+              <a:gd name="connsiteY5" fmla="*/ 1503527 h 1503527"/>
+              <a:gd name="connsiteX6" fmla="*/ 8313 w 3579413"/>
+              <a:gd name="connsiteY6" fmla="*/ 493431 h 1503527"/>
+              <a:gd name="connsiteX0" fmla="*/ 0 w 3579413"/>
+              <a:gd name="connsiteY0" fmla="*/ 1503527 h 1503527"/>
+              <a:gd name="connsiteX1" fmla="*/ 1991990 w 3579413"/>
+              <a:gd name="connsiteY1" fmla="*/ 482139 h 1503527"/>
+              <a:gd name="connsiteX2" fmla="*/ 1991990 w 3579413"/>
+              <a:gd name="connsiteY2" fmla="*/ 0 h 1503527"/>
+              <a:gd name="connsiteX3" fmla="*/ 3579413 w 3579413"/>
+              <a:gd name="connsiteY3" fmla="*/ 2980 h 1503527"/>
+              <a:gd name="connsiteX4" fmla="*/ 3562788 w 3579413"/>
+              <a:gd name="connsiteY4" fmla="*/ 1054639 h 1503527"/>
+              <a:gd name="connsiteX5" fmla="*/ 0 w 3579413"/>
+              <a:gd name="connsiteY5" fmla="*/ 1503527 h 1503527"/>
+              <a:gd name="connsiteX0" fmla="*/ 1570798 w 1587423"/>
+              <a:gd name="connsiteY0" fmla="*/ 1054639 h 1054639"/>
+              <a:gd name="connsiteX1" fmla="*/ 0 w 1587423"/>
+              <a:gd name="connsiteY1" fmla="*/ 482139 h 1054639"/>
+              <a:gd name="connsiteX2" fmla="*/ 0 w 1587423"/>
+              <a:gd name="connsiteY2" fmla="*/ 0 h 1054639"/>
+              <a:gd name="connsiteX3" fmla="*/ 1587423 w 1587423"/>
+              <a:gd name="connsiteY3" fmla="*/ 2980 h 1054639"/>
+              <a:gd name="connsiteX4" fmla="*/ 1570798 w 1587423"/>
+              <a:gd name="connsiteY4" fmla="*/ 1054639 h 1054639"/>
+              <a:gd name="connsiteX0" fmla="*/ 1595736 w 1612361"/>
+              <a:gd name="connsiteY0" fmla="*/ 1054639 h 1064030"/>
+              <a:gd name="connsiteX1" fmla="*/ 0 w 1612361"/>
+              <a:gd name="connsiteY1" fmla="*/ 1064030 h 1064030"/>
+              <a:gd name="connsiteX2" fmla="*/ 24938 w 1612361"/>
+              <a:gd name="connsiteY2" fmla="*/ 0 h 1064030"/>
+              <a:gd name="connsiteX3" fmla="*/ 1612361 w 1612361"/>
+              <a:gd name="connsiteY3" fmla="*/ 2980 h 1064030"/>
+              <a:gd name="connsiteX4" fmla="*/ 1595736 w 1612361"/>
+              <a:gd name="connsiteY4" fmla="*/ 1054639 h 1064030"/>
+              <a:gd name="connsiteX0" fmla="*/ 1595736 w 1612361"/>
+              <a:gd name="connsiteY0" fmla="*/ 1054639 h 1055717"/>
+              <a:gd name="connsiteX1" fmla="*/ 0 w 1612361"/>
+              <a:gd name="connsiteY1" fmla="*/ 1055717 h 1055717"/>
+              <a:gd name="connsiteX2" fmla="*/ 24938 w 1612361"/>
+              <a:gd name="connsiteY2" fmla="*/ 0 h 1055717"/>
+              <a:gd name="connsiteX3" fmla="*/ 1612361 w 1612361"/>
+              <a:gd name="connsiteY3" fmla="*/ 2980 h 1055717"/>
+              <a:gd name="connsiteX4" fmla="*/ 1595736 w 1612361"/>
+              <a:gd name="connsiteY4" fmla="*/ 1054639 h 1055717"/>
+              <a:gd name="connsiteX0" fmla="*/ 1570798 w 1587423"/>
+              <a:gd name="connsiteY0" fmla="*/ 1054639 h 1055717"/>
+              <a:gd name="connsiteX1" fmla="*/ 0 w 1587423"/>
+              <a:gd name="connsiteY1" fmla="*/ 1055717 h 1055717"/>
+              <a:gd name="connsiteX2" fmla="*/ 0 w 1587423"/>
+              <a:gd name="connsiteY2" fmla="*/ 0 h 1055717"/>
+              <a:gd name="connsiteX3" fmla="*/ 1587423 w 1587423"/>
+              <a:gd name="connsiteY3" fmla="*/ 2980 h 1055717"/>
+              <a:gd name="connsiteX4" fmla="*/ 1570798 w 1587423"/>
+              <a:gd name="connsiteY4" fmla="*/ 1054639 h 1055717"/>
+            </a:gdLst>
+            <a:ahLst/>
+            <a:cxnLst>
+              <a:cxn ang="0">
+                <a:pos x="connsiteX0" y="connsiteY0"/>
+              </a:cxn>
+              <a:cxn ang="0">
+                <a:pos x="connsiteX1" y="connsiteY1"/>
+              </a:cxn>
+              <a:cxn ang="0">
+                <a:pos x="connsiteX2" y="connsiteY2"/>
+              </a:cxn>
+              <a:cxn ang="0">
+                <a:pos x="connsiteX3" y="connsiteY3"/>
+              </a:cxn>
+              <a:cxn ang="0">
+                <a:pos x="connsiteX4" y="connsiteY4"/>
+              </a:cxn>
+            </a:cxnLst>
+            <a:rect l="l" t="t" r="r" b="b"/>
+            <a:pathLst>
+              <a:path w="1587423" h="1055717">
+                <a:moveTo>
+                  <a:pt x="1570798" y="1054639"/>
+                </a:moveTo>
+                <a:lnTo>
+                  <a:pt x="0" y="1055717"/>
+                </a:lnTo>
+                <a:lnTo>
+                  <a:pt x="0" y="0"/>
+                </a:lnTo>
+                <a:lnTo>
+                  <a:pt x="1587423" y="2980"/>
+                </a:lnTo>
+                <a:lnTo>
+                  <a:pt x="1570798" y="1054639"/>
+                </a:lnTo>
+                <a:close/>
+              </a:path>
+            </a:pathLst>
+          </a:custGeom>
+          <a:noFill/>
+          <a:ln w="28575"/>
+        </p:spPr>
+        <p:style>
+          <a:lnRef idx="2">
+            <a:schemeClr val="accent1">
+              <a:shade val="50000"/>
+            </a:schemeClr>
+          </a:lnRef>
+          <a:fillRef idx="1">
+            <a:schemeClr val="accent1"/>
+          </a:fillRef>
+          <a:effectRef idx="0">
+            <a:schemeClr val="accent1"/>
+          </a:effectRef>
+          <a:fontRef idx="minor">
+            <a:schemeClr val="lt1"/>
+          </a:fontRef>
+        </p:style>
+        <p:txBody>
+          <a:bodyPr rtlCol="0" anchor="ctr"/>
+          <a:lstStyle/>
+          <a:p>
+            <a:pPr algn="ctr"/>
+            <a:endParaRPr lang="en-US" dirty="0"/>
+          </a:p>
+        </p:txBody>
+      </p:sp>
+      <p:sp>
+        <p:nvSpPr>
+          <p:cNvPr id="29" name="Textfeld 28">
+            <a:extLst>
+              <a:ext uri="{FF2B5EF4-FFF2-40B4-BE49-F238E27FC236}">
+                <a16:creationId xmlns:a16="http://schemas.microsoft.com/office/drawing/2014/main" id="{2941B484-5C0B-431D-8864-743A75F6B925}"/>
+              </a:ext>
+            </a:extLst>
+          </p:cNvPr>
+          <p:cNvSpPr txBox="1"/>
+          <p:nvPr/>
+        </p:nvSpPr>
+        <p:spPr>
+          <a:xfrm>
+            <a:off x="2747425" y="5773173"/>
+            <a:ext cx="1146148" cy="307777"/>
+          </a:xfrm>
+          <a:prstGeom prst="rect">
+            <a:avLst/>
+          </a:prstGeom>
+          <a:noFill/>
+        </p:spPr>
+        <p:txBody>
+          <a:bodyPr wrap="none" rtlCol="0">
+            <a:spAutoFit/>
+          </a:bodyPr>
+          <a:lstStyle/>
+          <a:p>
+            <a:r>
+              <a:rPr lang="en-US" sz="1400" b="1" dirty="0">
+                <a:solidFill>
+                  <a:srgbClr val="004489"/>
+                </a:solidFill>
+              </a:rPr>
+              <a:t>Joined Part C</a:t>
+            </a:r>
+          </a:p>
+        </p:txBody>
+      </p:sp>
+      <p:sp>
+        <p:nvSpPr>
+          <p:cNvPr id="30" name="Textfeld 29">
+            <a:extLst>
+              <a:ext uri="{FF2B5EF4-FFF2-40B4-BE49-F238E27FC236}">
+                <a16:creationId xmlns:a16="http://schemas.microsoft.com/office/drawing/2014/main" id="{48F7CD4D-EE18-4E16-8B96-F9BB2692F46F}"/>
+              </a:ext>
+            </a:extLst>
+          </p:cNvPr>
+          <p:cNvSpPr txBox="1"/>
+          <p:nvPr/>
+        </p:nvSpPr>
+        <p:spPr>
+          <a:xfrm>
+            <a:off x="8314937" y="5259126"/>
+            <a:ext cx="1795941" cy="523220"/>
+          </a:xfrm>
+          <a:prstGeom prst="rect">
+            <a:avLst/>
+          </a:prstGeom>
+          <a:noFill/>
+        </p:spPr>
+        <p:txBody>
+          <a:bodyPr wrap="none" rtlCol="0">
+            <a:spAutoFit/>
+          </a:bodyPr>
+          <a:lstStyle/>
+          <a:p>
+            <a:r>
+              <a:rPr lang="en-US" sz="1400" b="1" dirty="0">
+                <a:solidFill>
+                  <a:srgbClr val="004489"/>
+                </a:solidFill>
+              </a:rPr>
+              <a:t>Reference to STEP file</a:t>
+            </a:r>
+            <a:br>
+              <a:rPr lang="en-US" sz="1400" b="1" dirty="0">
+                <a:solidFill>
+                  <a:srgbClr val="004489"/>
+                </a:solidFill>
+              </a:rPr>
+            </a:br>
+            <a:r>
+              <a:rPr lang="en-US" sz="1400" b="1" dirty="0">
+                <a:solidFill>
+                  <a:srgbClr val="004489"/>
+                </a:solidFill>
+              </a:rPr>
+              <a:t>(Geometry of Part C)</a:t>
+            </a:r>
+          </a:p>
+        </p:txBody>
+      </p:sp>
+    </p:spTree>
+    <p:extLst>
+      <p:ext uri="{BB962C8B-B14F-4D97-AF65-F5344CB8AC3E}">
+        <p14:creationId xmlns:p14="http://schemas.microsoft.com/office/powerpoint/2010/main" val="4004898650"/>
+      </p:ext>
+    </p:extLst>
+  </p:cSld>
+  <p:clrMapOvr>
+    <a:masterClrMapping/>
+  </p:clrMapOvr>
+</p:sld>
+</file>
+
+<file path=ppt/slides/slide2.xml><?xml version="1.0" encoding="utf-8"?>
+<p:sld xmlns:a="http://schemas.openxmlformats.org/drawingml/2006/main" xmlns:r="http://schemas.openxmlformats.org/officeDocument/2006/relationships" xmlns:p="http://schemas.openxmlformats.org/presentationml/2006/main">
+  <p:cSld>
+    <p:spTree>
+      <p:nvGrpSpPr>
+        <p:cNvPr id="1" name=""/>
+        <p:cNvGrpSpPr/>
+        <p:nvPr/>
+      </p:nvGrpSpPr>
+      <p:grpSpPr>
+        <a:xfrm>
+          <a:off x="0" y="0"/>
+          <a:ext cx="0" cy="0"/>
+          <a:chOff x="0" y="0"/>
+          <a:chExt cx="0" cy="0"/>
+        </a:xfrm>
+      </p:grpSpPr>
+      <p:sp>
+        <p:nvSpPr>
+          <p:cNvPr id="4" name="Textfeld 3">
+            <a:extLst>
+              <a:ext uri="{FF2B5EF4-FFF2-40B4-BE49-F238E27FC236}">
+                <a16:creationId xmlns:a16="http://schemas.microsoft.com/office/drawing/2014/main" id="{7E4F8260-3115-496F-B901-6D8A40CF88FD}"/>
+              </a:ext>
+            </a:extLst>
+          </p:cNvPr>
+          <p:cNvSpPr txBox="1"/>
+          <p:nvPr/>
+        </p:nvSpPr>
+        <p:spPr>
+          <a:xfrm>
+            <a:off x="4225364" y="2031110"/>
+            <a:ext cx="2313454" cy="1569660"/>
+          </a:xfrm>
+          <a:prstGeom prst="rect">
+            <a:avLst/>
+          </a:prstGeom>
+          <a:noFill/>
+        </p:spPr>
+        <p:txBody>
+          <a:bodyPr wrap="none" rtlCol="0">
+            <a:spAutoFit/>
+          </a:bodyPr>
+          <a:lstStyle/>
+          <a:p>
+            <a:r>
+              <a:rPr lang="en-US" sz="9600" b="1" dirty="0">
+                <a:solidFill>
+                  <a:srgbClr val="FF0000"/>
+                </a:solidFill>
+              </a:rPr>
+              <a:t>OLD</a:t>
+            </a:r>
+          </a:p>
+        </p:txBody>
+      </p:sp>
+    </p:spTree>
+    <p:extLst>
+      <p:ext uri="{BB962C8B-B14F-4D97-AF65-F5344CB8AC3E}">
+        <p14:creationId xmlns:p14="http://schemas.microsoft.com/office/powerpoint/2010/main" val="2956172302"/>
+      </p:ext>
+    </p:extLst>
+  </p:cSld>
+  <p:clrMapOvr>
+    <a:masterClrMapping/>
+  </p:clrMapOvr>
+</p:sld>
+</file>
+
+<file path=ppt/slides/slide3.xml><?xml version="1.0" encoding="utf-8"?>
+<p:sld xmlns:a="http://schemas.openxmlformats.org/drawingml/2006/main" xmlns:r="http://schemas.openxmlformats.org/officeDocument/2006/relationships" xmlns:p="http://schemas.openxmlformats.org/presentationml/2006/main">
+  <p:cSld>
+    <p:spTree>
+      <p:nvGrpSpPr>
+        <p:cNvPr id="1" name=""/>
+        <p:cNvGrpSpPr/>
+        <p:nvPr/>
+      </p:nvGrpSpPr>
+      <p:grpSpPr>
+        <a:xfrm>
+          <a:off x="0" y="0"/>
+          <a:ext cx="0" cy="0"/>
+          <a:chOff x="0" y="0"/>
+          <a:chExt cx="0" cy="0"/>
+        </a:xfrm>
+      </p:grpSpPr>
+      <p:pic>
+        <p:nvPicPr>
           <p:cNvPr id="22" name="Grafik 21">
             <a:extLst>
               <a:ext uri="{FF2B5EF4-FFF2-40B4-BE49-F238E27FC236}">
@@ -8368,7 +10564,7 @@
     </p:spTree>
     <p:extLst>
       <p:ext uri="{BB962C8B-B14F-4D97-AF65-F5344CB8AC3E}">
-        <p14:creationId xmlns:p14="http://schemas.microsoft.com/office/powerpoint/2010/main" val="4004898650"/>
+        <p14:creationId xmlns:p14="http://schemas.microsoft.com/office/powerpoint/2010/main" val="501241340"/>
       </p:ext>
     </p:extLst>
   </p:cSld>
@@ -8378,7 +10574,7 @@
 </p:sld>
 </file>
 
-<file path=ppt/slides/slide2.xml><?xml version="1.0" encoding="utf-8"?>
+<file path=ppt/slides/slide4.xml><?xml version="1.0" encoding="utf-8"?>
 <p:sld xmlns:a="http://schemas.openxmlformats.org/drawingml/2006/main" xmlns:r="http://schemas.openxmlformats.org/officeDocument/2006/relationships" xmlns:p="http://schemas.openxmlformats.org/presentationml/2006/main">
   <p:cSld>
     <p:spTree>
@@ -9566,7 +11762,7 @@
 </p:sld>
 </file>
 
-<file path=ppt/slides/slide3.xml><?xml version="1.0" encoding="utf-8"?>
+<file path=ppt/slides/slide5.xml><?xml version="1.0" encoding="utf-8"?>
 <p:sld xmlns:a="http://schemas.openxmlformats.org/drawingml/2006/main" xmlns:r="http://schemas.openxmlformats.org/officeDocument/2006/relationships" xmlns:p="http://schemas.openxmlformats.org/presentationml/2006/main">
   <p:cSld>
     <p:spTree>

</xml_diff>